<commit_message>
Final version of Processes lecture for Darmstadt Feb 2017
</commit_message>
<xml_diff>
--- a/undergraduate/lectures/processes.pptx
+++ b/undergraduate/lectures/processes.pptx
@@ -5,7 +5,7 @@
     <p:sldMasterId id="2147483786" r:id="rId1"/>
   </p:sldMasterIdLst>
   <p:notesMasterIdLst>
-    <p:notesMasterId r:id="rId35"/>
+    <p:notesMasterId r:id="rId37"/>
   </p:notesMasterIdLst>
   <p:sldIdLst>
     <p:sldId id="256" r:id="rId2"/>
@@ -34,13 +34,15 @@
     <p:sldId id="275" r:id="rId25"/>
     <p:sldId id="276" r:id="rId26"/>
     <p:sldId id="278" r:id="rId27"/>
-    <p:sldId id="279" r:id="rId28"/>
-    <p:sldId id="284" r:id="rId29"/>
-    <p:sldId id="292" r:id="rId30"/>
-    <p:sldId id="287" r:id="rId31"/>
-    <p:sldId id="286" r:id="rId32"/>
-    <p:sldId id="289" r:id="rId33"/>
-    <p:sldId id="290" r:id="rId34"/>
+    <p:sldId id="293" r:id="rId28"/>
+    <p:sldId id="294" r:id="rId29"/>
+    <p:sldId id="284" r:id="rId30"/>
+    <p:sldId id="292" r:id="rId31"/>
+    <p:sldId id="295" r:id="rId32"/>
+    <p:sldId id="287" r:id="rId33"/>
+    <p:sldId id="286" r:id="rId34"/>
+    <p:sldId id="289" r:id="rId35"/>
+    <p:sldId id="290" r:id="rId36"/>
   </p:sldIdLst>
   <p:sldSz cx="12192000" cy="6858000"/>
   <p:notesSz cx="6858000" cy="9144000"/>
@@ -178,9 +180,11 @@
             <p14:sldId id="275"/>
             <p14:sldId id="276"/>
             <p14:sldId id="278"/>
-            <p14:sldId id="279"/>
+            <p14:sldId id="293"/>
+            <p14:sldId id="294"/>
             <p14:sldId id="284"/>
             <p14:sldId id="292"/>
+            <p14:sldId id="295"/>
             <p14:sldId id="287"/>
             <p14:sldId id="286"/>
             <p14:sldId id="289"/>
@@ -281,7 +285,7 @@
           <a:p>
             <a:fld id="{EC53E720-1243-6043-B4C4-6E31C619CC0A}" type="datetimeFigureOut">
               <a:rPr lang="en-US" smtClean="0"/>
-              <a:t>2/22/17</a:t>
+              <a:t>2/23/17</a:t>
             </a:fld>
             <a:endParaRPr lang="en-US"/>
           </a:p>
@@ -954,7 +958,7 @@
           <a:p>
             <a:fld id="{95DA03C6-6B2A-3D4E-ACBF-63391107FCA5}" type="datetime1">
               <a:rPr lang="en-US" smtClean="0"/>
-              <a:t>2/22/17</a:t>
+              <a:t>2/23/17</a:t>
             </a:fld>
             <a:endParaRPr lang="en-US"/>
           </a:p>
@@ -1421,7 +1425,7 @@
           <a:p>
             <a:fld id="{6F310967-D635-1C4B-8010-EE130F91BB63}" type="datetime1">
               <a:rPr lang="en-US" smtClean="0"/>
-              <a:t>2/22/17</a:t>
+              <a:t>2/23/17</a:t>
             </a:fld>
             <a:endParaRPr lang="en-US"/>
           </a:p>
@@ -1590,7 +1594,7 @@
           <a:p>
             <a:fld id="{652B615D-AC37-794B-9CD1-917BECA41F70}" type="datetime1">
               <a:rPr lang="en-US" smtClean="0"/>
-              <a:t>2/22/17</a:t>
+              <a:t>2/23/17</a:t>
             </a:fld>
             <a:endParaRPr lang="en-US"/>
           </a:p>
@@ -1845,7 +1849,7 @@
           <a:p>
             <a:fld id="{5DC51015-F320-0A4F-959E-3D859876C438}" type="datetime1">
               <a:rPr lang="en-US" smtClean="0"/>
-              <a:t>2/22/17</a:t>
+              <a:t>2/23/17</a:t>
             </a:fld>
             <a:endParaRPr lang="en-US"/>
           </a:p>
@@ -2023,7 +2027,7 @@
           <a:p>
             <a:fld id="{4B1B9092-98F8-3943-8253-FED67AD371E9}" type="datetime1">
               <a:rPr lang="en-US" smtClean="0"/>
-              <a:t>2/22/17</a:t>
+              <a:t>2/23/17</a:t>
             </a:fld>
             <a:endParaRPr lang="en-US"/>
           </a:p>
@@ -2208,7 +2212,7 @@
           <a:p>
             <a:fld id="{4B1B9092-98F8-3943-8253-FED67AD371E9}" type="datetime1">
               <a:rPr lang="en-US" smtClean="0"/>
-              <a:t>2/22/17</a:t>
+              <a:t>2/23/17</a:t>
             </a:fld>
             <a:endParaRPr lang="en-US"/>
           </a:p>
@@ -2614,7 +2618,7 @@
           <a:p>
             <a:fld id="{28960D5E-7767-5B4E-BF7E-AE3C5D61F3FF}" type="datetime1">
               <a:rPr lang="en-US" smtClean="0"/>
-              <a:t>2/22/17</a:t>
+              <a:t>2/23/17</a:t>
             </a:fld>
             <a:endParaRPr lang="en-US"/>
           </a:p>
@@ -2908,7 +2912,7 @@
           <a:p>
             <a:fld id="{416A0E0A-1609-FB44-8228-EEF5C54B5A55}" type="datetime1">
               <a:rPr lang="en-US" smtClean="0"/>
-              <a:t>2/22/17</a:t>
+              <a:t>2/23/17</a:t>
             </a:fld>
             <a:endParaRPr lang="en-US" dirty="0"/>
           </a:p>
@@ -3295,7 +3299,7 @@
           <a:p>
             <a:fld id="{8D566A62-F6F0-FB4F-9669-760CD9DCEC73}" type="datetime1">
               <a:rPr lang="en-US" smtClean="0"/>
-              <a:t>2/22/17</a:t>
+              <a:t>2/23/17</a:t>
             </a:fld>
             <a:endParaRPr lang="en-US"/>
           </a:p>
@@ -3419,7 +3423,7 @@
           <a:p>
             <a:fld id="{6B34C88A-1865-1F43-A0DB-344805F7492E}" type="datetime1">
               <a:rPr lang="en-US" smtClean="0"/>
-              <a:t>2/22/17</a:t>
+              <a:t>2/23/17</a:t>
             </a:fld>
             <a:endParaRPr lang="en-US"/>
           </a:p>
@@ -3596,7 +3600,7 @@
           <a:p>
             <a:fld id="{8B4004B4-FF14-FF4D-B044-59094E9AC0F1}" type="datetime1">
               <a:rPr lang="en-US" smtClean="0"/>
-              <a:t>2/22/17</a:t>
+              <a:t>2/23/17</a:t>
             </a:fld>
             <a:endParaRPr lang="en-US"/>
           </a:p>
@@ -3956,7 +3960,7 @@
           <a:p>
             <a:fld id="{862984A0-B2F5-2549-A24F-764B1F76A93B}" type="datetime1">
               <a:rPr lang="en-US" smtClean="0"/>
-              <a:t>2/22/17</a:t>
+              <a:t>2/23/17</a:t>
             </a:fld>
             <a:endParaRPr lang="en-US"/>
           </a:p>
@@ -4270,7 +4274,7 @@
           <a:p>
             <a:fld id="{B27188E3-ED48-3E43-BB72-DB8091BEB4A5}" type="datetime1">
               <a:rPr lang="en-US" smtClean="0"/>
-              <a:t>2/22/17</a:t>
+              <a:t>2/23/17</a:t>
             </a:fld>
             <a:endParaRPr lang="en-US" dirty="0"/>
           </a:p>
@@ -10213,7 +10217,7 @@
         </p:nvSpPr>
         <p:spPr>
           <a:xfrm>
-            <a:off x="1573619" y="659219"/>
+            <a:off x="1573619" y="1286540"/>
             <a:ext cx="2030818" cy="1807534"/>
           </a:xfrm>
           <a:prstGeom prst="rect">
@@ -10263,14 +10267,14 @@
         </p:nvSpPr>
         <p:spPr>
           <a:xfrm>
-            <a:off x="6478171" y="659219"/>
+            <a:off x="6478171" y="1286540"/>
             <a:ext cx="2030818" cy="1807534"/>
           </a:xfrm>
           <a:prstGeom prst="rect">
             <a:avLst/>
           </a:prstGeom>
           <a:solidFill>
-            <a:srgbClr val="92D050"/>
+            <a:srgbClr val="FFC000"/>
           </a:solidFill>
           <a:ln>
             <a:noFill/>
@@ -10313,7 +10317,7 @@
         </p:nvSpPr>
         <p:spPr>
           <a:xfrm>
-            <a:off x="1573619" y="3211033"/>
+            <a:off x="1573619" y="3838354"/>
             <a:ext cx="2030818" cy="1924493"/>
           </a:xfrm>
           <a:prstGeom prst="ellipse">
@@ -10370,7 +10374,7 @@
         </p:nvSpPr>
         <p:spPr>
           <a:xfrm>
-            <a:off x="6478171" y="3211033"/>
+            <a:off x="6478171" y="3838354"/>
             <a:ext cx="2030818" cy="1924493"/>
           </a:xfrm>
           <a:prstGeom prst="ellipse">
@@ -10427,7 +10431,7 @@
         </p:nvSpPr>
         <p:spPr>
           <a:xfrm>
-            <a:off x="1487155" y="1239820"/>
+            <a:off x="3739348" y="1220810"/>
             <a:ext cx="2203745" cy="646331"/>
           </a:xfrm>
           <a:prstGeom prst="rect">
@@ -10463,8 +10467,8 @@
         </p:nvSpPr>
         <p:spPr>
           <a:xfrm>
-            <a:off x="6564634" y="1239820"/>
-            <a:ext cx="2202783" cy="646331"/>
+            <a:off x="8594050" y="1286539"/>
+            <a:ext cx="2544030" cy="646331"/>
           </a:xfrm>
           <a:prstGeom prst="rect">
             <a:avLst/>
@@ -10479,7 +10483,15 @@
           <a:p>
             <a:r>
               <a:rPr lang="en-US" dirty="0" smtClean="0"/>
-              <a:t>Thread B takes a lock</a:t>
+              <a:t>Thread B </a:t>
+            </a:r>
+            <a:r>
+              <a:rPr lang="en-US" dirty="0" smtClean="0"/>
+              <a:t>waits for a </a:t>
+            </a:r>
+            <a:r>
+              <a:rPr lang="en-US" dirty="0" smtClean="0"/>
+              <a:t>lock</a:t>
             </a:r>
           </a:p>
           <a:p>
@@ -10488,106 +10500,6 @@
               <a:t>on Shared Data A</a:t>
             </a:r>
             <a:endParaRPr lang="en-US" dirty="0"/>
-          </a:p>
-        </p:txBody>
-      </p:sp>
-      <p:sp>
-        <p:nvSpPr>
-          <p:cNvPr id="18" name="Circular Arrow 17"/>
-          <p:cNvSpPr/>
-          <p:nvPr/>
-        </p:nvSpPr>
-        <p:spPr>
-          <a:xfrm>
-            <a:off x="2324086" y="2630431"/>
-            <a:ext cx="8755039" cy="2419412"/>
-          </a:xfrm>
-          <a:prstGeom prst="circularArrow">
-            <a:avLst>
-              <a:gd name="adj1" fmla="val 1207"/>
-              <a:gd name="adj2" fmla="val 174280"/>
-              <a:gd name="adj3" fmla="val 20635339"/>
-              <a:gd name="adj4" fmla="val 11295863"/>
-              <a:gd name="adj5" fmla="val 6128"/>
-            </a:avLst>
-          </a:prstGeom>
-        </p:spPr>
-        <p:style>
-          <a:lnRef idx="2">
-            <a:schemeClr val="accent1">
-              <a:shade val="50000"/>
-            </a:schemeClr>
-          </a:lnRef>
-          <a:fillRef idx="1">
-            <a:schemeClr val="accent1"/>
-          </a:fillRef>
-          <a:effectRef idx="0">
-            <a:schemeClr val="accent1"/>
-          </a:effectRef>
-          <a:fontRef idx="minor">
-            <a:schemeClr val="lt1"/>
-          </a:fontRef>
-        </p:style>
-        <p:txBody>
-          <a:bodyPr rtlCol="0" anchor="ctr"/>
-          <a:lstStyle/>
-          <a:p>
-            <a:pPr algn="ctr"/>
-            <a:endParaRPr lang="en-US">
-              <a:solidFill>
-                <a:schemeClr val="tx1"/>
-              </a:solidFill>
-            </a:endParaRPr>
-          </a:p>
-        </p:txBody>
-      </p:sp>
-      <p:sp>
-        <p:nvSpPr>
-          <p:cNvPr id="19" name="Circular Arrow 18"/>
-          <p:cNvSpPr/>
-          <p:nvPr/>
-        </p:nvSpPr>
-        <p:spPr>
-          <a:xfrm flipH="1" flipV="1">
-            <a:off x="4561367" y="3791012"/>
-            <a:ext cx="3264196" cy="2247636"/>
-          </a:xfrm>
-          <a:prstGeom prst="circularArrow">
-            <a:avLst>
-              <a:gd name="adj1" fmla="val 1402"/>
-              <a:gd name="adj2" fmla="val 527590"/>
-              <a:gd name="adj3" fmla="val 20587662"/>
-              <a:gd name="adj4" fmla="val 11108982"/>
-              <a:gd name="adj5" fmla="val 7761"/>
-            </a:avLst>
-          </a:prstGeom>
-        </p:spPr>
-        <p:style>
-          <a:lnRef idx="2">
-            <a:schemeClr val="accent1">
-              <a:shade val="50000"/>
-            </a:schemeClr>
-          </a:lnRef>
-          <a:fillRef idx="1">
-            <a:schemeClr val="accent1"/>
-          </a:fillRef>
-          <a:effectRef idx="0">
-            <a:schemeClr val="accent1"/>
-          </a:effectRef>
-          <a:fontRef idx="minor">
-            <a:schemeClr val="lt1"/>
-          </a:fontRef>
-        </p:style>
-        <p:txBody>
-          <a:bodyPr rtlCol="0" anchor="ctr"/>
-          <a:lstStyle/>
-          <a:p>
-            <a:pPr algn="ctr"/>
-            <a:endParaRPr lang="en-US">
-              <a:solidFill>
-                <a:schemeClr val="tx1"/>
-              </a:solidFill>
-            </a:endParaRPr>
           </a:p>
         </p:txBody>
       </p:sp>
@@ -10599,8 +10511,8 @@
         </p:nvSpPr>
         <p:spPr>
           <a:xfrm>
-            <a:off x="597564" y="2472575"/>
-            <a:ext cx="2250488" cy="646331"/>
+            <a:off x="3739348" y="1867141"/>
+            <a:ext cx="2203745" cy="646331"/>
           </a:xfrm>
           <a:prstGeom prst="rect">
             <a:avLst/>
@@ -10619,22 +10531,21 @@
             </a:r>
             <a:r>
               <a:rPr lang="en-US" dirty="0" smtClean="0"/>
-              <a:t>tries to lock</a:t>
-            </a:r>
-            <a:endParaRPr lang="en-US" dirty="0" smtClean="0"/>
-          </a:p>
-          <a:p>
-            <a:r>
-              <a:rPr lang="en-US" dirty="0" smtClean="0"/>
-              <a:t>Shared </a:t>
-            </a:r>
-            <a:r>
-              <a:rPr lang="en-US" dirty="0" smtClean="0"/>
-              <a:t>Data </a:t>
-            </a:r>
-            <a:r>
-              <a:rPr lang="en-US" dirty="0" smtClean="0"/>
-              <a:t>B</a:t>
+              <a:t>takes a</a:t>
+            </a:r>
+            <a:r>
+              <a:rPr lang="en-US" dirty="0" smtClean="0"/>
+              <a:t> </a:t>
+            </a:r>
+            <a:r>
+              <a:rPr lang="en-US" dirty="0" smtClean="0"/>
+              <a:t>lock</a:t>
+            </a:r>
+          </a:p>
+          <a:p>
+            <a:r>
+              <a:rPr lang="en-US" dirty="0" smtClean="0"/>
+              <a:t>Shared Data B</a:t>
             </a:r>
             <a:endParaRPr lang="en-US" dirty="0"/>
           </a:p>
@@ -10642,14 +10553,14 @@
       </p:sp>
       <p:sp>
         <p:nvSpPr>
-          <p:cNvPr id="21" name="TextBox 20"/>
+          <p:cNvPr id="14" name="TextBox 13"/>
           <p:cNvSpPr txBox="1"/>
           <p:nvPr/>
         </p:nvSpPr>
         <p:spPr>
           <a:xfrm>
-            <a:off x="8003004" y="5387218"/>
-            <a:ext cx="2249527" cy="646331"/>
+            <a:off x="3739348" y="2483062"/>
+            <a:ext cx="2470292" cy="646331"/>
           </a:xfrm>
           <a:prstGeom prst="rect">
             <a:avLst/>
@@ -10667,38 +10578,34 @@
               <a:t>Thread </a:t>
             </a:r>
             <a:r>
-              <a:rPr lang="en-US" dirty="0" smtClean="0"/>
-              <a:t>B tries to lock</a:t>
-            </a:r>
-            <a:endParaRPr lang="en-US" dirty="0" smtClean="0"/>
-          </a:p>
-          <a:p>
-            <a:r>
-              <a:rPr lang="en-US" dirty="0" smtClean="0"/>
-              <a:t>Shared </a:t>
-            </a:r>
-            <a:r>
-              <a:rPr lang="en-US" dirty="0" smtClean="0"/>
-              <a:t>Data </a:t>
-            </a:r>
-            <a:r>
               <a:rPr lang="en-US" dirty="0"/>
               <a:t>A</a:t>
             </a:r>
+            <a:r>
+              <a:rPr lang="en-US" dirty="0" smtClean="0"/>
+              <a:t> releases a lock</a:t>
+            </a:r>
+            <a:endParaRPr lang="en-US" dirty="0" smtClean="0"/>
+          </a:p>
+          <a:p>
+            <a:r>
+              <a:rPr lang="en-US" dirty="0" smtClean="0"/>
+              <a:t>on Shared Data A</a:t>
+            </a:r>
             <a:endParaRPr lang="en-US" dirty="0"/>
           </a:p>
         </p:txBody>
       </p:sp>
       <p:sp>
         <p:nvSpPr>
-          <p:cNvPr id="22" name="TextBox 21"/>
+          <p:cNvPr id="15" name="TextBox 14"/>
           <p:cNvSpPr txBox="1"/>
           <p:nvPr/>
         </p:nvSpPr>
         <p:spPr>
           <a:xfrm>
-            <a:off x="4496828" y="90473"/>
-            <a:ext cx="3201517" cy="769441"/>
+            <a:off x="3739348" y="3129393"/>
+            <a:ext cx="2470292" cy="646331"/>
           </a:xfrm>
           <a:prstGeom prst="rect">
             <a:avLst/>
@@ -10712,17 +10619,152 @@
           <a:lstStyle/>
           <a:p>
             <a:r>
-              <a:rPr lang="en-US" sz="4400" dirty="0" smtClean="0"/>
-              <a:t>DEADLOCK</a:t>
-            </a:r>
-            <a:endParaRPr lang="en-US" sz="4400" dirty="0"/>
+              <a:rPr lang="en-US" dirty="0" smtClean="0"/>
+              <a:t>Thread </a:t>
+            </a:r>
+            <a:r>
+              <a:rPr lang="en-US" dirty="0"/>
+              <a:t>A</a:t>
+            </a:r>
+            <a:r>
+              <a:rPr lang="en-US" dirty="0" smtClean="0"/>
+              <a:t> releases a lock</a:t>
+            </a:r>
+            <a:endParaRPr lang="en-US" dirty="0" smtClean="0"/>
+          </a:p>
+          <a:p>
+            <a:r>
+              <a:rPr lang="en-US" dirty="0" smtClean="0"/>
+              <a:t>on Shared Data </a:t>
+            </a:r>
+            <a:r>
+              <a:rPr lang="en-US" dirty="0" smtClean="0"/>
+              <a:t>B</a:t>
+            </a:r>
+            <a:endParaRPr lang="en-US" dirty="0"/>
+          </a:p>
+        </p:txBody>
+      </p:sp>
+      <p:sp>
+        <p:nvSpPr>
+          <p:cNvPr id="16" name="TextBox 15"/>
+          <p:cNvSpPr txBox="1"/>
+          <p:nvPr/>
+        </p:nvSpPr>
+        <p:spPr>
+          <a:xfrm>
+            <a:off x="8508989" y="1932870"/>
+            <a:ext cx="2407967" cy="646331"/>
+          </a:xfrm>
+          <a:prstGeom prst="rect">
+            <a:avLst/>
+          </a:prstGeom>
+          <a:noFill/>
+        </p:spPr>
+        <p:txBody>
+          <a:bodyPr wrap="none" rtlCol="0">
+            <a:spAutoFit/>
+          </a:bodyPr>
+          <a:lstStyle/>
+          <a:p>
+            <a:r>
+              <a:rPr lang="en-US" dirty="0" smtClean="0"/>
+              <a:t>Thread </a:t>
+            </a:r>
+            <a:r>
+              <a:rPr lang="en-US" dirty="0"/>
+              <a:t>B</a:t>
+            </a:r>
+            <a:r>
+              <a:rPr lang="en-US" dirty="0" smtClean="0"/>
+              <a:t> takes the lock</a:t>
+            </a:r>
+          </a:p>
+          <a:p>
+            <a:r>
+              <a:rPr lang="en-US" dirty="0" smtClean="0"/>
+              <a:t>on Shared Data A</a:t>
+            </a:r>
+          </a:p>
+        </p:txBody>
+      </p:sp>
+      <p:sp>
+        <p:nvSpPr>
+          <p:cNvPr id="17" name="TextBox 16"/>
+          <p:cNvSpPr txBox="1"/>
+          <p:nvPr/>
+        </p:nvSpPr>
+        <p:spPr>
+          <a:xfrm>
+            <a:off x="8508988" y="2562446"/>
+            <a:ext cx="2407967" cy="646331"/>
+          </a:xfrm>
+          <a:prstGeom prst="rect">
+            <a:avLst/>
+          </a:prstGeom>
+          <a:noFill/>
+        </p:spPr>
+        <p:txBody>
+          <a:bodyPr wrap="none" rtlCol="0">
+            <a:spAutoFit/>
+          </a:bodyPr>
+          <a:lstStyle/>
+          <a:p>
+            <a:r>
+              <a:rPr lang="en-US" dirty="0" smtClean="0"/>
+              <a:t>Thread </a:t>
+            </a:r>
+            <a:r>
+              <a:rPr lang="en-US" dirty="0"/>
+              <a:t>B</a:t>
+            </a:r>
+            <a:r>
+              <a:rPr lang="en-US" dirty="0" smtClean="0"/>
+              <a:t> takes the lock</a:t>
+            </a:r>
+          </a:p>
+          <a:p>
+            <a:r>
+              <a:rPr lang="en-US" dirty="0" smtClean="0"/>
+              <a:t>on Shared Data B</a:t>
+            </a:r>
+          </a:p>
+        </p:txBody>
+      </p:sp>
+      <p:sp>
+        <p:nvSpPr>
+          <p:cNvPr id="2" name="TextBox 1"/>
+          <p:cNvSpPr txBox="1"/>
+          <p:nvPr/>
+        </p:nvSpPr>
+        <p:spPr>
+          <a:xfrm>
+            <a:off x="2045932" y="356371"/>
+            <a:ext cx="8103309" cy="523220"/>
+          </a:xfrm>
+          <a:prstGeom prst="rect">
+            <a:avLst/>
+          </a:prstGeom>
+          <a:noFill/>
+        </p:spPr>
+        <p:txBody>
+          <a:bodyPr wrap="none" rtlCol="0">
+            <a:spAutoFit/>
+          </a:bodyPr>
+          <a:lstStyle/>
+          <a:p>
+            <a:r>
+              <a:rPr lang="en-US" sz="2800" dirty="0" smtClean="0"/>
+              <a:t>Correct Locking with Two Threads and Two Structures</a:t>
+            </a:r>
+            <a:endParaRPr lang="en-US" sz="2800" dirty="0"/>
           </a:p>
         </p:txBody>
       </p:sp>
     </p:spTree>
     <p:extLst>
       <p:ext uri="{BB962C8B-B14F-4D97-AF65-F5344CB8AC3E}">
-        <p14:creationId xmlns:p14="http://schemas.microsoft.com/office/powerpoint/2010/main" val="1243597546"/>
+        <p14:creationId xmlns:p14="http://schemas.microsoft.com/office/powerpoint/2010/main" val="705177196"/>
       </p:ext>
     </p:extLst>
   </p:cSld>
@@ -10750,24 +10792,29 @@
                             </p:stCondLst>
                             <p:childTnLst>
                               <p:par>
-                                <p:cTn id="5" presetID="42" presetClass="path" presetSubtype="0" accel="50000" decel="50000" fill="hold" grpId="0" nodeType="clickEffect">
+                                <p:cTn id="5" presetID="1" presetClass="entr" presetSubtype="0" fill="hold" grpId="1" nodeType="clickEffect">
                                   <p:stCondLst>
                                     <p:cond delay="0"/>
                                   </p:stCondLst>
                                   <p:childTnLst>
-                                    <p:animMotion origin="layout" path="M 2.08333E-7 -4.81481E-6 L 0.18359 -0.00092 " pathEditMode="relative" rAng="0" ptsTypes="AA">
+                                    <p:set>
                                       <p:cBhvr>
-                                        <p:cTn id="6" dur="2000" fill="hold"/>
+                                        <p:cTn id="6" dur="1" fill="hold">
+                                          <p:stCondLst>
+                                            <p:cond delay="0"/>
+                                          </p:stCondLst>
+                                        </p:cTn>
                                         <p:tgtEl>
-                                          <p:spTgt spid="7"/>
+                                          <p:spTgt spid="9"/>
                                         </p:tgtEl>
                                         <p:attrNameLst>
-                                          <p:attrName>ppt_x</p:attrName>
-                                          <p:attrName>ppt_y</p:attrName>
+                                          <p:attrName>style.visibility</p:attrName>
                                         </p:attrNameLst>
                                       </p:cBhvr>
-                                      <p:rCtr x="9180" y="-46"/>
-                                    </p:animMotion>
+                                      <p:to>
+                                        <p:strVal val="visible"/>
+                                      </p:to>
+                                    </p:set>
                                   </p:childTnLst>
                                 </p:cTn>
                               </p:par>
@@ -10790,70 +10837,30 @@
                             </p:stCondLst>
                             <p:childTnLst>
                               <p:par>
-                                <p:cTn id="9" presetID="42" presetClass="path" presetSubtype="0" accel="50000" decel="50000" fill="hold" grpId="0" nodeType="clickEffect">
-                                  <p:stCondLst>
-                                    <p:cond delay="0"/>
-                                  </p:stCondLst>
-                                  <p:childTnLst>
-                                    <p:animMotion origin="layout" path="M 2.08333E-7 2.22222E-6 L -1.875E-6 0.38079 " pathEditMode="relative" rAng="0" ptsTypes="AA">
-                                      <p:cBhvr>
-                                        <p:cTn id="10" dur="2000" fill="hold"/>
-                                        <p:tgtEl>
-                                          <p:spTgt spid="5"/>
-                                        </p:tgtEl>
-                                        <p:attrNameLst>
-                                          <p:attrName>ppt_x</p:attrName>
-                                          <p:attrName>ppt_y</p:attrName>
-                                        </p:attrNameLst>
-                                      </p:cBhvr>
-                                      <p:rCtr x="65" y="18912"/>
-                                    </p:animMotion>
-                                  </p:childTnLst>
-                                </p:cTn>
-                              </p:par>
-                            </p:childTnLst>
-                          </p:cTn>
-                        </p:par>
-                      </p:childTnLst>
-                    </p:cTn>
-                  </p:par>
-                  <p:par>
-                    <p:cTn id="11" fill="hold">
-                      <p:stCondLst>
-                        <p:cond delay="indefinite"/>
-                      </p:stCondLst>
-                      <p:childTnLst>
-                        <p:par>
-                          <p:cTn id="12" fill="hold">
-                            <p:stCondLst>
-                              <p:cond delay="0"/>
-                            </p:stCondLst>
-                            <p:childTnLst>
-                              <p:par>
-                                <p:cTn id="13" presetID="1" presetClass="emph" presetSubtype="2" fill="hold" nodeType="clickEffect">
+                                <p:cTn id="9" presetID="1" presetClass="emph" presetSubtype="2" fill="hold" nodeType="clickEffect">
                                   <p:stCondLst>
                                     <p:cond delay="0"/>
                                   </p:stCondLst>
                                   <p:childTnLst>
                                     <p:animClr clrSpc="rgb" dir="cw">
                                       <p:cBhvr>
-                                        <p:cTn id="14" dur="2000" fill="hold"/>
+                                        <p:cTn id="10" dur="1000" fill="hold"/>
                                         <p:tgtEl>
-                                          <p:spTgt spid="5"/>
+                                          <p:spTgt spid="7"/>
                                         </p:tgtEl>
                                         <p:attrNameLst>
                                           <p:attrName>fillcolor</p:attrName>
                                         </p:attrNameLst>
                                       </p:cBhvr>
                                       <p:to>
-                                        <a:schemeClr val="accent2"/>
+                                        <a:schemeClr val="hlink"/>
                                       </p:to>
                                     </p:animClr>
                                     <p:set>
                                       <p:cBhvr>
-                                        <p:cTn id="15" dur="2000" fill="hold"/>
+                                        <p:cTn id="11" dur="1000" fill="hold"/>
                                         <p:tgtEl>
-                                          <p:spTgt spid="5"/>
+                                          <p:spTgt spid="7"/>
                                         </p:tgtEl>
                                         <p:attrNameLst>
                                           <p:attrName>fill.type</p:attrName>
@@ -10865,9 +10872,9 @@
                                     </p:set>
                                     <p:set>
                                       <p:cBhvr>
-                                        <p:cTn id="16" dur="2000" fill="hold"/>
+                                        <p:cTn id="12" dur="1000" fill="hold"/>
                                         <p:tgtEl>
-                                          <p:spTgt spid="5"/>
+                                          <p:spTgt spid="7"/>
                                         </p:tgtEl>
                                         <p:attrNameLst>
                                           <p:attrName>fill.on</p:attrName>
@@ -10875,6 +10882,51 @@
                                       </p:cBhvr>
                                       <p:to>
                                         <p:strVal val="true"/>
+                                      </p:to>
+                                    </p:set>
+                                  </p:childTnLst>
+                                </p:cTn>
+                              </p:par>
+                            </p:childTnLst>
+                          </p:cTn>
+                        </p:par>
+                      </p:childTnLst>
+                    </p:cTn>
+                  </p:par>
+                  <p:par>
+                    <p:cTn id="13" fill="hold">
+                      <p:stCondLst>
+                        <p:cond delay="indefinite"/>
+                      </p:stCondLst>
+                      <p:childTnLst>
+                        <p:par>
+                          <p:cTn id="14" fill="hold">
+                            <p:stCondLst>
+                              <p:cond delay="0"/>
+                            </p:stCondLst>
+                            <p:childTnLst>
+                              <p:par>
+                                <p:cTn id="15" presetID="1" presetClass="exit" presetSubtype="0" fill="hold" grpId="0" nodeType="clickEffect">
+                                  <p:stCondLst>
+                                    <p:cond delay="0"/>
+                                  </p:stCondLst>
+                                  <p:childTnLst>
+                                    <p:set>
+                                      <p:cBhvr>
+                                        <p:cTn id="16" dur="1" fill="hold">
+                                          <p:stCondLst>
+                                            <p:cond delay="0"/>
+                                          </p:stCondLst>
+                                        </p:cTn>
+                                        <p:tgtEl>
+                                          <p:spTgt spid="9"/>
+                                        </p:tgtEl>
+                                        <p:attrNameLst>
+                                          <p:attrName>style.visibility</p:attrName>
+                                        </p:attrNameLst>
+                                      </p:cBhvr>
+                                      <p:to>
+                                        <p:strVal val="hidden"/>
                                       </p:to>
                                     </p:set>
                                   </p:childTnLst>
@@ -10899,7 +10951,7 @@
                             </p:stCondLst>
                             <p:childTnLst>
                               <p:par>
-                                <p:cTn id="19" presetID="1" presetClass="entr" presetSubtype="0" fill="hold" grpId="0" nodeType="clickEffect">
+                                <p:cTn id="19" presetID="1" presetClass="entr" presetSubtype="0" fill="hold" grpId="2" nodeType="clickEffect">
                                   <p:stCondLst>
                                     <p:cond delay="0"/>
                                   </p:stCondLst>
@@ -10912,7 +10964,7 @@
                                           </p:stCondLst>
                                         </p:cTn>
                                         <p:tgtEl>
-                                          <p:spTgt spid="9"/>
+                                          <p:spTgt spid="20"/>
                                         </p:tgtEl>
                                         <p:attrNameLst>
                                           <p:attrName>style.visibility</p:attrName>
@@ -10944,110 +10996,30 @@
                             </p:stCondLst>
                             <p:childTnLst>
                               <p:par>
-                                <p:cTn id="23" presetID="42" presetClass="path" presetSubtype="0" accel="50000" decel="50000" fill="hold" grpId="0" nodeType="clickEffect">
-                                  <p:stCondLst>
-                                    <p:cond delay="0"/>
-                                  </p:stCondLst>
-                                  <p:childTnLst>
-                                    <p:animMotion origin="layout" path="M -3.33333E-6 -4.81481E-6 L 0.19818 -0.00092 " pathEditMode="relative" rAng="0" ptsTypes="AA">
-                                      <p:cBhvr>
-                                        <p:cTn id="24" dur="2000" fill="hold"/>
-                                        <p:tgtEl>
-                                          <p:spTgt spid="8"/>
-                                        </p:tgtEl>
-                                        <p:attrNameLst>
-                                          <p:attrName>ppt_x</p:attrName>
-                                          <p:attrName>ppt_y</p:attrName>
-                                        </p:attrNameLst>
-                                      </p:cBhvr>
-                                      <p:rCtr x="9909" y="-46"/>
-                                    </p:animMotion>
-                                  </p:childTnLst>
-                                </p:cTn>
-                              </p:par>
-                            </p:childTnLst>
-                          </p:cTn>
-                        </p:par>
-                      </p:childTnLst>
-                    </p:cTn>
-                  </p:par>
-                  <p:par>
-                    <p:cTn id="25" fill="hold">
-                      <p:stCondLst>
-                        <p:cond delay="indefinite"/>
-                      </p:stCondLst>
-                      <p:childTnLst>
-                        <p:par>
-                          <p:cTn id="26" fill="hold">
-                            <p:stCondLst>
-                              <p:cond delay="0"/>
-                            </p:stCondLst>
-                            <p:childTnLst>
-                              <p:par>
-                                <p:cTn id="27" presetID="42" presetClass="path" presetSubtype="0" accel="50000" decel="50000" fill="hold" grpId="0" nodeType="clickEffect">
-                                  <p:stCondLst>
-                                    <p:cond delay="0"/>
-                                  </p:stCondLst>
-                                  <p:childTnLst>
-                                    <p:animMotion origin="layout" path="M -3.33333E-6 2.22222E-6 L -3.75E-6 0.38079 " pathEditMode="relative" rAng="0" ptsTypes="AA">
-                                      <p:cBhvr>
-                                        <p:cTn id="28" dur="2000" fill="hold"/>
-                                        <p:tgtEl>
-                                          <p:spTgt spid="6"/>
-                                        </p:tgtEl>
-                                        <p:attrNameLst>
-                                          <p:attrName>ppt_x</p:attrName>
-                                          <p:attrName>ppt_y</p:attrName>
-                                        </p:attrNameLst>
-                                      </p:cBhvr>
-                                      <p:rCtr x="13" y="18519"/>
-                                    </p:animMotion>
-                                  </p:childTnLst>
-                                </p:cTn>
-                              </p:par>
-                            </p:childTnLst>
-                          </p:cTn>
-                        </p:par>
-                      </p:childTnLst>
-                    </p:cTn>
-                  </p:par>
-                  <p:par>
-                    <p:cTn id="29" fill="hold">
-                      <p:stCondLst>
-                        <p:cond delay="indefinite"/>
-                      </p:stCondLst>
-                      <p:childTnLst>
-                        <p:par>
-                          <p:cTn id="30" fill="hold">
-                            <p:stCondLst>
-                              <p:cond delay="0"/>
-                            </p:stCondLst>
-                            <p:childTnLst>
-                              <p:par>
-                                <p:cTn id="31" presetID="1" presetClass="emph" presetSubtype="2" fill="hold" nodeType="clickEffect">
+                                <p:cTn id="23" presetID="1" presetClass="emph" presetSubtype="2" fill="hold" nodeType="clickEffect">
                                   <p:stCondLst>
                                     <p:cond delay="0"/>
                                   </p:stCondLst>
                                   <p:childTnLst>
                                     <p:animClr clrSpc="rgb" dir="cw">
                                       <p:cBhvr>
-                                        <p:cTn id="32" dur="2000" fill="hold"/>
+                                        <p:cTn id="24" dur="1000" fill="hold"/>
                                         <p:tgtEl>
-                                          <p:spTgt spid="6"/>
+                                          <p:spTgt spid="8"/>
                                         </p:tgtEl>
                                         <p:attrNameLst>
                                           <p:attrName>fillcolor</p:attrName>
                                         </p:attrNameLst>
                                       </p:cBhvr>
                                       <p:to>
-                                        <a:schemeClr val="accent2"/>
+                                        <a:schemeClr val="hlink"/>
                                       </p:to>
                                     </p:animClr>
                                     <p:set>
                                       <p:cBhvr>
-                                        <p:cTn id="33" dur="2000" fill="hold"/>
+                                        <p:cTn id="25" dur="1000" fill="hold"/>
                                         <p:tgtEl>
-                                          <p:spTgt spid="6"/>
+                                          <p:spTgt spid="8"/>
                                         </p:tgtEl>
                                         <p:attrNameLst>
                                           <p:attrName>fill.type</p:attrName>
@@ -11059,9 +11031,9 @@
                                     </p:set>
                                     <p:set>
                                       <p:cBhvr>
-                                        <p:cTn id="34" dur="2000" fill="hold"/>
+                                        <p:cTn id="26" dur="1000" fill="hold"/>
                                         <p:tgtEl>
-                                          <p:spTgt spid="6"/>
+                                          <p:spTgt spid="8"/>
                                         </p:tgtEl>
                                         <p:attrNameLst>
                                           <p:attrName>fill.on</p:attrName>
@@ -11081,26 +11053,71 @@
                     </p:cTn>
                   </p:par>
                   <p:par>
-                    <p:cTn id="35" fill="hold">
+                    <p:cTn id="27" fill="hold">
                       <p:stCondLst>
                         <p:cond delay="indefinite"/>
                       </p:stCondLst>
                       <p:childTnLst>
                         <p:par>
-                          <p:cTn id="36" fill="hold">
+                          <p:cTn id="28" fill="hold">
                             <p:stCondLst>
                               <p:cond delay="0"/>
                             </p:stCondLst>
                             <p:childTnLst>
                               <p:par>
-                                <p:cTn id="37" presetID="1" presetClass="entr" presetSubtype="0" fill="hold" grpId="0" nodeType="clickEffect">
+                                <p:cTn id="29" presetID="1" presetClass="exit" presetSubtype="0" fill="hold" grpId="3" nodeType="clickEffect">
                                   <p:stCondLst>
                                     <p:cond delay="0"/>
                                   </p:stCondLst>
                                   <p:childTnLst>
                                     <p:set>
                                       <p:cBhvr>
-                                        <p:cTn id="38" dur="1" fill="hold">
+                                        <p:cTn id="30" dur="1" fill="hold">
+                                          <p:stCondLst>
+                                            <p:cond delay="0"/>
+                                          </p:stCondLst>
+                                        </p:cTn>
+                                        <p:tgtEl>
+                                          <p:spTgt spid="20"/>
+                                        </p:tgtEl>
+                                        <p:attrNameLst>
+                                          <p:attrName>style.visibility</p:attrName>
+                                        </p:attrNameLst>
+                                      </p:cBhvr>
+                                      <p:to>
+                                        <p:strVal val="hidden"/>
+                                      </p:to>
+                                    </p:set>
+                                  </p:childTnLst>
+                                </p:cTn>
+                              </p:par>
+                            </p:childTnLst>
+                          </p:cTn>
+                        </p:par>
+                      </p:childTnLst>
+                    </p:cTn>
+                  </p:par>
+                  <p:par>
+                    <p:cTn id="31" fill="hold">
+                      <p:stCondLst>
+                        <p:cond delay="indefinite"/>
+                      </p:stCondLst>
+                      <p:childTnLst>
+                        <p:par>
+                          <p:cTn id="32" fill="hold">
+                            <p:stCondLst>
+                              <p:cond delay="0"/>
+                            </p:stCondLst>
+                            <p:childTnLst>
+                              <p:par>
+                                <p:cTn id="33" presetID="1" presetClass="entr" presetSubtype="0" fill="hold" grpId="0" nodeType="clickEffect">
+                                  <p:stCondLst>
+                                    <p:cond delay="0"/>
+                                  </p:stCondLst>
+                                  <p:childTnLst>
+                                    <p:set>
+                                      <p:cBhvr>
+                                        <p:cTn id="34" dur="1" fill="hold">
                                           <p:stCondLst>
                                             <p:cond delay="0"/>
                                           </p:stCondLst>
@@ -11126,32 +11143,101 @@
                     </p:cTn>
                   </p:par>
                   <p:par>
-                    <p:cTn id="39" fill="hold">
+                    <p:cTn id="35" fill="hold">
                       <p:stCondLst>
                         <p:cond delay="indefinite"/>
                       </p:stCondLst>
                       <p:childTnLst>
                         <p:par>
-                          <p:cTn id="40" fill="hold">
+                          <p:cTn id="36" fill="hold">
                             <p:stCondLst>
                               <p:cond delay="0"/>
                             </p:stCondLst>
                             <p:childTnLst>
                               <p:par>
-                                <p:cTn id="41" presetID="1" presetClass="entr" presetSubtype="0" fill="hold" grpId="0" nodeType="clickEffect">
+                                <p:cTn id="37" presetID="1" presetClass="emph" presetSubtype="2" fill="hold" nodeType="clickEffect">
+                                  <p:stCondLst>
+                                    <p:cond delay="0"/>
+                                  </p:stCondLst>
+                                  <p:childTnLst>
+                                    <p:animClr clrSpc="rgb" dir="cw">
+                                      <p:cBhvr>
+                                        <p:cTn id="38" dur="1000" fill="hold"/>
+                                        <p:tgtEl>
+                                          <p:spTgt spid="6"/>
+                                        </p:tgtEl>
+                                        <p:attrNameLst>
+                                          <p:attrName>fillcolor</p:attrName>
+                                        </p:attrNameLst>
+                                      </p:cBhvr>
+                                      <p:to>
+                                        <a:schemeClr val="accent2"/>
+                                      </p:to>
+                                    </p:animClr>
+                                    <p:set>
+                                      <p:cBhvr>
+                                        <p:cTn id="39" dur="1000" fill="hold"/>
+                                        <p:tgtEl>
+                                          <p:spTgt spid="6"/>
+                                        </p:tgtEl>
+                                        <p:attrNameLst>
+                                          <p:attrName>fill.type</p:attrName>
+                                        </p:attrNameLst>
+                                      </p:cBhvr>
+                                      <p:to>
+                                        <p:strVal val="solid"/>
+                                      </p:to>
+                                    </p:set>
+                                    <p:set>
+                                      <p:cBhvr>
+                                        <p:cTn id="40" dur="1000" fill="hold"/>
+                                        <p:tgtEl>
+                                          <p:spTgt spid="6"/>
+                                        </p:tgtEl>
+                                        <p:attrNameLst>
+                                          <p:attrName>fill.on</p:attrName>
+                                        </p:attrNameLst>
+                                      </p:cBhvr>
+                                      <p:to>
+                                        <p:strVal val="true"/>
+                                      </p:to>
+                                    </p:set>
+                                  </p:childTnLst>
+                                </p:cTn>
+                              </p:par>
+                            </p:childTnLst>
+                          </p:cTn>
+                        </p:par>
+                      </p:childTnLst>
+                    </p:cTn>
+                  </p:par>
+                  <p:par>
+                    <p:cTn id="41" fill="hold">
+                      <p:stCondLst>
+                        <p:cond delay="indefinite"/>
+                      </p:stCondLst>
+                      <p:childTnLst>
+                        <p:par>
+                          <p:cTn id="42" fill="hold">
+                            <p:stCondLst>
+                              <p:cond delay="0"/>
+                            </p:stCondLst>
+                            <p:childTnLst>
+                              <p:par>
+                                <p:cTn id="43" presetID="1" presetClass="entr" presetSubtype="0" fill="hold" grpId="1" nodeType="clickEffect">
                                   <p:stCondLst>
                                     <p:cond delay="0"/>
                                   </p:stCondLst>
                                   <p:childTnLst>
                                     <p:set>
                                       <p:cBhvr>
-                                        <p:cTn id="42" dur="1" fill="hold">
+                                        <p:cTn id="44" dur="1" fill="hold">
                                           <p:stCondLst>
                                             <p:cond delay="0"/>
                                           </p:stCondLst>
                                         </p:cTn>
                                         <p:tgtEl>
-                                          <p:spTgt spid="18"/>
+                                          <p:spTgt spid="14"/>
                                         </p:tgtEl>
                                         <p:attrNameLst>
                                           <p:attrName>style.visibility</p:attrName>
@@ -11171,26 +11257,1489 @@
                     </p:cTn>
                   </p:par>
                   <p:par>
-                    <p:cTn id="43" fill="hold">
+                    <p:cTn id="45" fill="hold">
                       <p:stCondLst>
                         <p:cond delay="indefinite"/>
                       </p:stCondLst>
                       <p:childTnLst>
                         <p:par>
-                          <p:cTn id="44" fill="hold">
+                          <p:cTn id="46" fill="hold">
                             <p:stCondLst>
                               <p:cond delay="0"/>
                             </p:stCondLst>
                             <p:childTnLst>
                               <p:par>
-                                <p:cTn id="45" presetID="1" presetClass="entr" presetSubtype="0" fill="hold" grpId="0" nodeType="clickEffect">
+                                <p:cTn id="47" presetID="1" presetClass="emph" presetSubtype="2" fill="hold" nodeType="clickEffect">
+                                  <p:stCondLst>
+                                    <p:cond delay="0"/>
+                                  </p:stCondLst>
+                                  <p:childTnLst>
+                                    <p:animClr clrSpc="rgb" dir="cw">
+                                      <p:cBhvr>
+                                        <p:cTn id="48" dur="1000" fill="hold"/>
+                                        <p:tgtEl>
+                                          <p:spTgt spid="7"/>
+                                        </p:tgtEl>
+                                        <p:attrNameLst>
+                                          <p:attrName>fillcolor</p:attrName>
+                                        </p:attrNameLst>
+                                      </p:cBhvr>
+                                      <p:to>
+                                        <a:srgbClr val="76D6FF"/>
+                                      </p:to>
+                                    </p:animClr>
+                                    <p:set>
+                                      <p:cBhvr>
+                                        <p:cTn id="49" dur="1000" fill="hold"/>
+                                        <p:tgtEl>
+                                          <p:spTgt spid="7"/>
+                                        </p:tgtEl>
+                                        <p:attrNameLst>
+                                          <p:attrName>fill.type</p:attrName>
+                                        </p:attrNameLst>
+                                      </p:cBhvr>
+                                      <p:to>
+                                        <p:strVal val="solid"/>
+                                      </p:to>
+                                    </p:set>
+                                    <p:set>
+                                      <p:cBhvr>
+                                        <p:cTn id="50" dur="1000" fill="hold"/>
+                                        <p:tgtEl>
+                                          <p:spTgt spid="7"/>
+                                        </p:tgtEl>
+                                        <p:attrNameLst>
+                                          <p:attrName>fill.on</p:attrName>
+                                        </p:attrNameLst>
+                                      </p:cBhvr>
+                                      <p:to>
+                                        <p:strVal val="true"/>
+                                      </p:to>
+                                    </p:set>
+                                  </p:childTnLst>
+                                </p:cTn>
+                              </p:par>
+                            </p:childTnLst>
+                          </p:cTn>
+                        </p:par>
+                      </p:childTnLst>
+                    </p:cTn>
+                  </p:par>
+                  <p:par>
+                    <p:cTn id="51" fill="hold">
+                      <p:stCondLst>
+                        <p:cond delay="indefinite"/>
+                      </p:stCondLst>
+                      <p:childTnLst>
+                        <p:par>
+                          <p:cTn id="52" fill="hold">
+                            <p:stCondLst>
+                              <p:cond delay="0"/>
+                            </p:stCondLst>
+                            <p:childTnLst>
+                              <p:par>
+                                <p:cTn id="53" presetID="1" presetClass="exit" presetSubtype="0" fill="hold" grpId="0" nodeType="clickEffect">
                                   <p:stCondLst>
                                     <p:cond delay="0"/>
                                   </p:stCondLst>
                                   <p:childTnLst>
                                     <p:set>
                                       <p:cBhvr>
-                                        <p:cTn id="46" dur="1" fill="hold">
+                                        <p:cTn id="54" dur="1" fill="hold">
+                                          <p:stCondLst>
+                                            <p:cond delay="0"/>
+                                          </p:stCondLst>
+                                        </p:cTn>
+                                        <p:tgtEl>
+                                          <p:spTgt spid="14"/>
+                                        </p:tgtEl>
+                                        <p:attrNameLst>
+                                          <p:attrName>style.visibility</p:attrName>
+                                        </p:attrNameLst>
+                                      </p:cBhvr>
+                                      <p:to>
+                                        <p:strVal val="hidden"/>
+                                      </p:to>
+                                    </p:set>
+                                  </p:childTnLst>
+                                </p:cTn>
+                              </p:par>
+                            </p:childTnLst>
+                          </p:cTn>
+                        </p:par>
+                      </p:childTnLst>
+                    </p:cTn>
+                  </p:par>
+                  <p:par>
+                    <p:cTn id="55" fill="hold">
+                      <p:stCondLst>
+                        <p:cond delay="indefinite"/>
+                      </p:stCondLst>
+                      <p:childTnLst>
+                        <p:par>
+                          <p:cTn id="56" fill="hold">
+                            <p:stCondLst>
+                              <p:cond delay="0"/>
+                            </p:stCondLst>
+                            <p:childTnLst>
+                              <p:par>
+                                <p:cTn id="57" presetID="1" presetClass="entr" presetSubtype="0" fill="hold" grpId="1" nodeType="clickEffect">
+                                  <p:stCondLst>
+                                    <p:cond delay="0"/>
+                                  </p:stCondLst>
+                                  <p:childTnLst>
+                                    <p:set>
+                                      <p:cBhvr>
+                                        <p:cTn id="58" dur="1" fill="hold">
+                                          <p:stCondLst>
+                                            <p:cond delay="0"/>
+                                          </p:stCondLst>
+                                        </p:cTn>
+                                        <p:tgtEl>
+                                          <p:spTgt spid="15"/>
+                                        </p:tgtEl>
+                                        <p:attrNameLst>
+                                          <p:attrName>style.visibility</p:attrName>
+                                        </p:attrNameLst>
+                                      </p:cBhvr>
+                                      <p:to>
+                                        <p:strVal val="visible"/>
+                                      </p:to>
+                                    </p:set>
+                                  </p:childTnLst>
+                                </p:cTn>
+                              </p:par>
+                            </p:childTnLst>
+                          </p:cTn>
+                        </p:par>
+                      </p:childTnLst>
+                    </p:cTn>
+                  </p:par>
+                  <p:par>
+                    <p:cTn id="59" fill="hold">
+                      <p:stCondLst>
+                        <p:cond delay="indefinite"/>
+                      </p:stCondLst>
+                      <p:childTnLst>
+                        <p:par>
+                          <p:cTn id="60" fill="hold">
+                            <p:stCondLst>
+                              <p:cond delay="0"/>
+                            </p:stCondLst>
+                            <p:childTnLst>
+                              <p:par>
+                                <p:cTn id="61" presetID="1" presetClass="emph" presetSubtype="2" fill="hold" nodeType="clickEffect">
+                                  <p:stCondLst>
+                                    <p:cond delay="0"/>
+                                  </p:stCondLst>
+                                  <p:childTnLst>
+                                    <p:animClr clrSpc="rgb" dir="cw">
+                                      <p:cBhvr>
+                                        <p:cTn id="62" dur="1000" fill="hold"/>
+                                        <p:tgtEl>
+                                          <p:spTgt spid="8"/>
+                                        </p:tgtEl>
+                                        <p:attrNameLst>
+                                          <p:attrName>fillcolor</p:attrName>
+                                        </p:attrNameLst>
+                                      </p:cBhvr>
+                                      <p:to>
+                                        <a:srgbClr val="9437FF"/>
+                                      </p:to>
+                                    </p:animClr>
+                                    <p:set>
+                                      <p:cBhvr>
+                                        <p:cTn id="63" dur="1000" fill="hold"/>
+                                        <p:tgtEl>
+                                          <p:spTgt spid="8"/>
+                                        </p:tgtEl>
+                                        <p:attrNameLst>
+                                          <p:attrName>fill.type</p:attrName>
+                                        </p:attrNameLst>
+                                      </p:cBhvr>
+                                      <p:to>
+                                        <p:strVal val="solid"/>
+                                      </p:to>
+                                    </p:set>
+                                    <p:set>
+                                      <p:cBhvr>
+                                        <p:cTn id="64" dur="1000" fill="hold"/>
+                                        <p:tgtEl>
+                                          <p:spTgt spid="8"/>
+                                        </p:tgtEl>
+                                        <p:attrNameLst>
+                                          <p:attrName>fill.on</p:attrName>
+                                        </p:attrNameLst>
+                                      </p:cBhvr>
+                                      <p:to>
+                                        <p:strVal val="true"/>
+                                      </p:to>
+                                    </p:set>
+                                  </p:childTnLst>
+                                </p:cTn>
+                              </p:par>
+                            </p:childTnLst>
+                          </p:cTn>
+                        </p:par>
+                      </p:childTnLst>
+                    </p:cTn>
+                  </p:par>
+                  <p:par>
+                    <p:cTn id="65" fill="hold">
+                      <p:stCondLst>
+                        <p:cond delay="indefinite"/>
+                      </p:stCondLst>
+                      <p:childTnLst>
+                        <p:par>
+                          <p:cTn id="66" fill="hold">
+                            <p:stCondLst>
+                              <p:cond delay="0"/>
+                            </p:stCondLst>
+                            <p:childTnLst>
+                              <p:par>
+                                <p:cTn id="67" presetID="1" presetClass="exit" presetSubtype="0" fill="hold" grpId="0" nodeType="clickEffect">
+                                  <p:stCondLst>
+                                    <p:cond delay="0"/>
+                                  </p:stCondLst>
+                                  <p:childTnLst>
+                                    <p:set>
+                                      <p:cBhvr>
+                                        <p:cTn id="68" dur="1" fill="hold">
+                                          <p:stCondLst>
+                                            <p:cond delay="0"/>
+                                          </p:stCondLst>
+                                        </p:cTn>
+                                        <p:tgtEl>
+                                          <p:spTgt spid="15"/>
+                                        </p:tgtEl>
+                                        <p:attrNameLst>
+                                          <p:attrName>style.visibility</p:attrName>
+                                        </p:attrNameLst>
+                                      </p:cBhvr>
+                                      <p:to>
+                                        <p:strVal val="hidden"/>
+                                      </p:to>
+                                    </p:set>
+                                  </p:childTnLst>
+                                </p:cTn>
+                              </p:par>
+                            </p:childTnLst>
+                          </p:cTn>
+                        </p:par>
+                      </p:childTnLst>
+                    </p:cTn>
+                  </p:par>
+                  <p:par>
+                    <p:cTn id="69" fill="hold">
+                      <p:stCondLst>
+                        <p:cond delay="indefinite"/>
+                      </p:stCondLst>
+                      <p:childTnLst>
+                        <p:par>
+                          <p:cTn id="70" fill="hold">
+                            <p:stCondLst>
+                              <p:cond delay="0"/>
+                            </p:stCondLst>
+                            <p:childTnLst>
+                              <p:par>
+                                <p:cTn id="71" presetID="1" presetClass="emph" presetSubtype="2" fill="hold" nodeType="clickEffect">
+                                  <p:stCondLst>
+                                    <p:cond delay="0"/>
+                                  </p:stCondLst>
+                                  <p:childTnLst>
+                                    <p:animClr clrSpc="rgb" dir="cw">
+                                      <p:cBhvr>
+                                        <p:cTn id="72" dur="1000" fill="hold"/>
+                                        <p:tgtEl>
+                                          <p:spTgt spid="6"/>
+                                        </p:tgtEl>
+                                        <p:attrNameLst>
+                                          <p:attrName>fillcolor</p:attrName>
+                                        </p:attrNameLst>
+                                      </p:cBhvr>
+                                      <p:to>
+                                        <a:srgbClr val="FF9300"/>
+                                      </p:to>
+                                    </p:animClr>
+                                    <p:set>
+                                      <p:cBhvr>
+                                        <p:cTn id="73" dur="1000" fill="hold"/>
+                                        <p:tgtEl>
+                                          <p:spTgt spid="6"/>
+                                        </p:tgtEl>
+                                        <p:attrNameLst>
+                                          <p:attrName>fill.type</p:attrName>
+                                        </p:attrNameLst>
+                                      </p:cBhvr>
+                                      <p:to>
+                                        <p:strVal val="solid"/>
+                                      </p:to>
+                                    </p:set>
+                                    <p:set>
+                                      <p:cBhvr>
+                                        <p:cTn id="74" dur="1000" fill="hold"/>
+                                        <p:tgtEl>
+                                          <p:spTgt spid="6"/>
+                                        </p:tgtEl>
+                                        <p:attrNameLst>
+                                          <p:attrName>fill.on</p:attrName>
+                                        </p:attrNameLst>
+                                      </p:cBhvr>
+                                      <p:to>
+                                        <p:strVal val="true"/>
+                                      </p:to>
+                                    </p:set>
+                                  </p:childTnLst>
+                                </p:cTn>
+                              </p:par>
+                            </p:childTnLst>
+                          </p:cTn>
+                        </p:par>
+                      </p:childTnLst>
+                    </p:cTn>
+                  </p:par>
+                  <p:par>
+                    <p:cTn id="75" fill="hold">
+                      <p:stCondLst>
+                        <p:cond delay="indefinite"/>
+                      </p:stCondLst>
+                      <p:childTnLst>
+                        <p:par>
+                          <p:cTn id="76" fill="hold">
+                            <p:stCondLst>
+                              <p:cond delay="0"/>
+                            </p:stCondLst>
+                            <p:childTnLst>
+                              <p:par>
+                                <p:cTn id="77" presetID="1" presetClass="exit" presetSubtype="0" fill="hold" grpId="1" nodeType="clickEffect">
+                                  <p:stCondLst>
+                                    <p:cond delay="0"/>
+                                  </p:stCondLst>
+                                  <p:childTnLst>
+                                    <p:set>
+                                      <p:cBhvr>
+                                        <p:cTn id="78" dur="1" fill="hold">
+                                          <p:stCondLst>
+                                            <p:cond delay="0"/>
+                                          </p:stCondLst>
+                                        </p:cTn>
+                                        <p:tgtEl>
+                                          <p:spTgt spid="10"/>
+                                        </p:tgtEl>
+                                        <p:attrNameLst>
+                                          <p:attrName>style.visibility</p:attrName>
+                                        </p:attrNameLst>
+                                      </p:cBhvr>
+                                      <p:to>
+                                        <p:strVal val="hidden"/>
+                                      </p:to>
+                                    </p:set>
+                                  </p:childTnLst>
+                                </p:cTn>
+                              </p:par>
+                            </p:childTnLst>
+                          </p:cTn>
+                        </p:par>
+                      </p:childTnLst>
+                    </p:cTn>
+                  </p:par>
+                  <p:par>
+                    <p:cTn id="79" fill="hold">
+                      <p:stCondLst>
+                        <p:cond delay="indefinite"/>
+                      </p:stCondLst>
+                      <p:childTnLst>
+                        <p:par>
+                          <p:cTn id="80" fill="hold">
+                            <p:stCondLst>
+                              <p:cond delay="0"/>
+                            </p:stCondLst>
+                            <p:childTnLst>
+                              <p:par>
+                                <p:cTn id="81" presetID="1" presetClass="entr" presetSubtype="0" fill="hold" grpId="1" nodeType="clickEffect">
+                                  <p:stCondLst>
+                                    <p:cond delay="0"/>
+                                  </p:stCondLst>
+                                  <p:childTnLst>
+                                    <p:set>
+                                      <p:cBhvr>
+                                        <p:cTn id="82" dur="1" fill="hold">
+                                          <p:stCondLst>
+                                            <p:cond delay="0"/>
+                                          </p:stCondLst>
+                                        </p:cTn>
+                                        <p:tgtEl>
+                                          <p:spTgt spid="16"/>
+                                        </p:tgtEl>
+                                        <p:attrNameLst>
+                                          <p:attrName>style.visibility</p:attrName>
+                                        </p:attrNameLst>
+                                      </p:cBhvr>
+                                      <p:to>
+                                        <p:strVal val="visible"/>
+                                      </p:to>
+                                    </p:set>
+                                  </p:childTnLst>
+                                </p:cTn>
+                              </p:par>
+                            </p:childTnLst>
+                          </p:cTn>
+                        </p:par>
+                      </p:childTnLst>
+                    </p:cTn>
+                  </p:par>
+                  <p:par>
+                    <p:cTn id="83" fill="hold">
+                      <p:stCondLst>
+                        <p:cond delay="indefinite"/>
+                      </p:stCondLst>
+                      <p:childTnLst>
+                        <p:par>
+                          <p:cTn id="84" fill="hold">
+                            <p:stCondLst>
+                              <p:cond delay="0"/>
+                            </p:stCondLst>
+                            <p:childTnLst>
+                              <p:par>
+                                <p:cTn id="85" presetID="1" presetClass="emph" presetSubtype="2" fill="hold" nodeType="clickEffect">
+                                  <p:stCondLst>
+                                    <p:cond delay="0"/>
+                                  </p:stCondLst>
+                                  <p:childTnLst>
+                                    <p:animClr clrSpc="rgb" dir="cw">
+                                      <p:cBhvr>
+                                        <p:cTn id="86" dur="1000" fill="hold"/>
+                                        <p:tgtEl>
+                                          <p:spTgt spid="7"/>
+                                        </p:tgtEl>
+                                        <p:attrNameLst>
+                                          <p:attrName>fillcolor</p:attrName>
+                                        </p:attrNameLst>
+                                      </p:cBhvr>
+                                      <p:to>
+                                        <a:srgbClr val="FF9300"/>
+                                      </p:to>
+                                    </p:animClr>
+                                    <p:set>
+                                      <p:cBhvr>
+                                        <p:cTn id="87" dur="1000" fill="hold"/>
+                                        <p:tgtEl>
+                                          <p:spTgt spid="7"/>
+                                        </p:tgtEl>
+                                        <p:attrNameLst>
+                                          <p:attrName>fill.type</p:attrName>
+                                        </p:attrNameLst>
+                                      </p:cBhvr>
+                                      <p:to>
+                                        <p:strVal val="solid"/>
+                                      </p:to>
+                                    </p:set>
+                                    <p:set>
+                                      <p:cBhvr>
+                                        <p:cTn id="88" dur="1000" fill="hold"/>
+                                        <p:tgtEl>
+                                          <p:spTgt spid="7"/>
+                                        </p:tgtEl>
+                                        <p:attrNameLst>
+                                          <p:attrName>fill.on</p:attrName>
+                                        </p:attrNameLst>
+                                      </p:cBhvr>
+                                      <p:to>
+                                        <p:strVal val="true"/>
+                                      </p:to>
+                                    </p:set>
+                                  </p:childTnLst>
+                                </p:cTn>
+                              </p:par>
+                            </p:childTnLst>
+                          </p:cTn>
+                        </p:par>
+                      </p:childTnLst>
+                    </p:cTn>
+                  </p:par>
+                  <p:par>
+                    <p:cTn id="89" fill="hold">
+                      <p:stCondLst>
+                        <p:cond delay="indefinite"/>
+                      </p:stCondLst>
+                      <p:childTnLst>
+                        <p:par>
+                          <p:cTn id="90" fill="hold">
+                            <p:stCondLst>
+                              <p:cond delay="0"/>
+                            </p:stCondLst>
+                            <p:childTnLst>
+                              <p:par>
+                                <p:cTn id="91" presetID="1" presetClass="exit" presetSubtype="0" fill="hold" grpId="0" nodeType="clickEffect">
+                                  <p:stCondLst>
+                                    <p:cond delay="0"/>
+                                  </p:stCondLst>
+                                  <p:childTnLst>
+                                    <p:set>
+                                      <p:cBhvr>
+                                        <p:cTn id="92" dur="1" fill="hold">
+                                          <p:stCondLst>
+                                            <p:cond delay="0"/>
+                                          </p:stCondLst>
+                                        </p:cTn>
+                                        <p:tgtEl>
+                                          <p:spTgt spid="16"/>
+                                        </p:tgtEl>
+                                        <p:attrNameLst>
+                                          <p:attrName>style.visibility</p:attrName>
+                                        </p:attrNameLst>
+                                      </p:cBhvr>
+                                      <p:to>
+                                        <p:strVal val="hidden"/>
+                                      </p:to>
+                                    </p:set>
+                                  </p:childTnLst>
+                                </p:cTn>
+                              </p:par>
+                            </p:childTnLst>
+                          </p:cTn>
+                        </p:par>
+                      </p:childTnLst>
+                    </p:cTn>
+                  </p:par>
+                  <p:par>
+                    <p:cTn id="93" fill="hold">
+                      <p:stCondLst>
+                        <p:cond delay="indefinite"/>
+                      </p:stCondLst>
+                      <p:childTnLst>
+                        <p:par>
+                          <p:cTn id="94" fill="hold">
+                            <p:stCondLst>
+                              <p:cond delay="0"/>
+                            </p:stCondLst>
+                            <p:childTnLst>
+                              <p:par>
+                                <p:cTn id="95" presetID="1" presetClass="entr" presetSubtype="0" fill="hold" grpId="1" nodeType="clickEffect">
+                                  <p:stCondLst>
+                                    <p:cond delay="0"/>
+                                  </p:stCondLst>
+                                  <p:childTnLst>
+                                    <p:set>
+                                      <p:cBhvr>
+                                        <p:cTn id="96" dur="1" fill="hold">
+                                          <p:stCondLst>
+                                            <p:cond delay="0"/>
+                                          </p:stCondLst>
+                                        </p:cTn>
+                                        <p:tgtEl>
+                                          <p:spTgt spid="17"/>
+                                        </p:tgtEl>
+                                        <p:attrNameLst>
+                                          <p:attrName>style.visibility</p:attrName>
+                                        </p:attrNameLst>
+                                      </p:cBhvr>
+                                      <p:to>
+                                        <p:strVal val="visible"/>
+                                      </p:to>
+                                    </p:set>
+                                  </p:childTnLst>
+                                </p:cTn>
+                              </p:par>
+                            </p:childTnLst>
+                          </p:cTn>
+                        </p:par>
+                      </p:childTnLst>
+                    </p:cTn>
+                  </p:par>
+                  <p:par>
+                    <p:cTn id="97" fill="hold">
+                      <p:stCondLst>
+                        <p:cond delay="indefinite"/>
+                      </p:stCondLst>
+                      <p:childTnLst>
+                        <p:par>
+                          <p:cTn id="98" fill="hold">
+                            <p:stCondLst>
+                              <p:cond delay="0"/>
+                            </p:stCondLst>
+                            <p:childTnLst>
+                              <p:par>
+                                <p:cTn id="99" presetID="1" presetClass="emph" presetSubtype="2" fill="hold" nodeType="clickEffect">
+                                  <p:stCondLst>
+                                    <p:cond delay="0"/>
+                                  </p:stCondLst>
+                                  <p:childTnLst>
+                                    <p:animClr clrSpc="rgb" dir="cw">
+                                      <p:cBhvr>
+                                        <p:cTn id="100" dur="1000" fill="hold"/>
+                                        <p:tgtEl>
+                                          <p:spTgt spid="8"/>
+                                        </p:tgtEl>
+                                        <p:attrNameLst>
+                                          <p:attrName>fillcolor</p:attrName>
+                                        </p:attrNameLst>
+                                      </p:cBhvr>
+                                      <p:to>
+                                        <a:srgbClr val="FF9300"/>
+                                      </p:to>
+                                    </p:animClr>
+                                    <p:set>
+                                      <p:cBhvr>
+                                        <p:cTn id="101" dur="1000" fill="hold"/>
+                                        <p:tgtEl>
+                                          <p:spTgt spid="8"/>
+                                        </p:tgtEl>
+                                        <p:attrNameLst>
+                                          <p:attrName>fill.type</p:attrName>
+                                        </p:attrNameLst>
+                                      </p:cBhvr>
+                                      <p:to>
+                                        <p:strVal val="solid"/>
+                                      </p:to>
+                                    </p:set>
+                                    <p:set>
+                                      <p:cBhvr>
+                                        <p:cTn id="102" dur="1000" fill="hold"/>
+                                        <p:tgtEl>
+                                          <p:spTgt spid="8"/>
+                                        </p:tgtEl>
+                                        <p:attrNameLst>
+                                          <p:attrName>fill.on</p:attrName>
+                                        </p:attrNameLst>
+                                      </p:cBhvr>
+                                      <p:to>
+                                        <p:strVal val="true"/>
+                                      </p:to>
+                                    </p:set>
+                                  </p:childTnLst>
+                                </p:cTn>
+                              </p:par>
+                            </p:childTnLst>
+                          </p:cTn>
+                        </p:par>
+                      </p:childTnLst>
+                    </p:cTn>
+                  </p:par>
+                  <p:par>
+                    <p:cTn id="103" fill="hold">
+                      <p:stCondLst>
+                        <p:cond delay="indefinite"/>
+                      </p:stCondLst>
+                      <p:childTnLst>
+                        <p:par>
+                          <p:cTn id="104" fill="hold">
+                            <p:stCondLst>
+                              <p:cond delay="0"/>
+                            </p:stCondLst>
+                            <p:childTnLst>
+                              <p:par>
+                                <p:cTn id="105" presetID="1" presetClass="exit" presetSubtype="0" fill="hold" grpId="0" nodeType="clickEffect">
+                                  <p:stCondLst>
+                                    <p:cond delay="0"/>
+                                  </p:stCondLst>
+                                  <p:childTnLst>
+                                    <p:set>
+                                      <p:cBhvr>
+                                        <p:cTn id="106" dur="1" fill="hold">
+                                          <p:stCondLst>
+                                            <p:cond delay="0"/>
+                                          </p:stCondLst>
+                                        </p:cTn>
+                                        <p:tgtEl>
+                                          <p:spTgt spid="17"/>
+                                        </p:tgtEl>
+                                        <p:attrNameLst>
+                                          <p:attrName>style.visibility</p:attrName>
+                                        </p:attrNameLst>
+                                      </p:cBhvr>
+                                      <p:to>
+                                        <p:strVal val="hidden"/>
+                                      </p:to>
+                                    </p:set>
+                                  </p:childTnLst>
+                                </p:cTn>
+                              </p:par>
+                            </p:childTnLst>
+                          </p:cTn>
+                        </p:par>
+                      </p:childTnLst>
+                    </p:cTn>
+                  </p:par>
+                </p:childTnLst>
+              </p:cTn>
+              <p:prevCondLst>
+                <p:cond evt="onPrev" delay="0">
+                  <p:tgtEl>
+                    <p:sldTgt/>
+                  </p:tgtEl>
+                </p:cond>
+              </p:prevCondLst>
+              <p:nextCondLst>
+                <p:cond evt="onNext" delay="0">
+                  <p:tgtEl>
+                    <p:sldTgt/>
+                  </p:tgtEl>
+                </p:cond>
+              </p:nextCondLst>
+            </p:seq>
+          </p:childTnLst>
+        </p:cTn>
+      </p:par>
+    </p:tnLst>
+    <p:bldLst>
+      <p:bldP spid="9" grpId="0"/>
+      <p:bldP spid="9" grpId="1"/>
+      <p:bldP spid="10" grpId="0"/>
+      <p:bldP spid="10" grpId="1"/>
+      <p:bldP spid="20" grpId="2"/>
+      <p:bldP spid="20" grpId="3"/>
+      <p:bldP spid="14" grpId="0"/>
+      <p:bldP spid="14" grpId="1"/>
+      <p:bldP spid="15" grpId="0"/>
+      <p:bldP spid="15" grpId="1"/>
+      <p:bldP spid="16" grpId="0"/>
+      <p:bldP spid="16" grpId="1"/>
+      <p:bldP spid="17" grpId="0"/>
+      <p:bldP spid="17" grpId="1"/>
+    </p:bldLst>
+  </p:timing>
+</p:sld>
+</file>
+
+<file path=ppt/slides/slide28.xml><?xml version="1.0" encoding="utf-8"?>
+<p:sld xmlns:a="http://schemas.openxmlformats.org/drawingml/2006/main" xmlns:r="http://schemas.openxmlformats.org/officeDocument/2006/relationships" xmlns:p="http://schemas.openxmlformats.org/presentationml/2006/main">
+  <p:cSld>
+    <p:spTree>
+      <p:nvGrpSpPr>
+        <p:cNvPr id="1" name=""/>
+        <p:cNvGrpSpPr/>
+        <p:nvPr/>
+      </p:nvGrpSpPr>
+      <p:grpSpPr>
+        <a:xfrm>
+          <a:off x="0" y="0"/>
+          <a:ext cx="0" cy="0"/>
+          <a:chOff x="0" y="0"/>
+          <a:chExt cx="0" cy="0"/>
+        </a:xfrm>
+      </p:grpSpPr>
+      <p:sp>
+        <p:nvSpPr>
+          <p:cNvPr id="4" name="Footer Placeholder 3"/>
+          <p:cNvSpPr>
+            <a:spLocks noGrp="1"/>
+          </p:cNvSpPr>
+          <p:nvPr>
+            <p:ph type="ftr" sz="quarter" idx="11"/>
+          </p:nvPr>
+        </p:nvSpPr>
+        <p:spPr/>
+        <p:txBody>
+          <a:bodyPr/>
+          <a:lstStyle/>
+          <a:p>
+            <a:r>
+              <a:rPr lang="en-US" smtClean="0"/>
+              <a:t>Introduction to Operating Systems</a:t>
+            </a:r>
+            <a:endParaRPr lang="en-US" dirty="0"/>
+          </a:p>
+        </p:txBody>
+      </p:sp>
+      <p:sp>
+        <p:nvSpPr>
+          <p:cNvPr id="5" name="Rectangle 4"/>
+          <p:cNvSpPr/>
+          <p:nvPr/>
+        </p:nvSpPr>
+        <p:spPr>
+          <a:xfrm>
+            <a:off x="1573619" y="1286540"/>
+            <a:ext cx="2030818" cy="1807534"/>
+          </a:xfrm>
+          <a:prstGeom prst="rect">
+            <a:avLst/>
+          </a:prstGeom>
+          <a:solidFill>
+            <a:srgbClr val="92D050"/>
+          </a:solidFill>
+          <a:ln>
+            <a:noFill/>
+          </a:ln>
+        </p:spPr>
+        <p:style>
+          <a:lnRef idx="2">
+            <a:schemeClr val="accent1">
+              <a:shade val="50000"/>
+            </a:schemeClr>
+          </a:lnRef>
+          <a:fillRef idx="1">
+            <a:schemeClr val="accent1"/>
+          </a:fillRef>
+          <a:effectRef idx="0">
+            <a:schemeClr val="accent1"/>
+          </a:effectRef>
+          <a:fontRef idx="minor">
+            <a:schemeClr val="lt1"/>
+          </a:fontRef>
+        </p:style>
+        <p:txBody>
+          <a:bodyPr rtlCol="0" anchor="ctr"/>
+          <a:lstStyle/>
+          <a:p>
+            <a:pPr algn="ctr"/>
+            <a:r>
+              <a:rPr lang="en-US" dirty="0" smtClean="0"/>
+              <a:t>Thread A</a:t>
+            </a:r>
+            <a:endParaRPr lang="en-US" dirty="0"/>
+          </a:p>
+        </p:txBody>
+      </p:sp>
+      <p:sp>
+        <p:nvSpPr>
+          <p:cNvPr id="6" name="Rectangle 5"/>
+          <p:cNvSpPr/>
+          <p:nvPr/>
+        </p:nvSpPr>
+        <p:spPr>
+          <a:xfrm>
+            <a:off x="6478171" y="1286540"/>
+            <a:ext cx="2030818" cy="1807534"/>
+          </a:xfrm>
+          <a:prstGeom prst="rect">
+            <a:avLst/>
+          </a:prstGeom>
+          <a:solidFill>
+            <a:srgbClr val="FFC000"/>
+          </a:solidFill>
+          <a:ln>
+            <a:noFill/>
+          </a:ln>
+        </p:spPr>
+        <p:style>
+          <a:lnRef idx="2">
+            <a:schemeClr val="accent1">
+              <a:shade val="50000"/>
+            </a:schemeClr>
+          </a:lnRef>
+          <a:fillRef idx="1">
+            <a:schemeClr val="accent1"/>
+          </a:fillRef>
+          <a:effectRef idx="0">
+            <a:schemeClr val="accent1"/>
+          </a:effectRef>
+          <a:fontRef idx="minor">
+            <a:schemeClr val="lt1"/>
+          </a:fontRef>
+        </p:style>
+        <p:txBody>
+          <a:bodyPr rtlCol="0" anchor="ctr"/>
+          <a:lstStyle/>
+          <a:p>
+            <a:pPr algn="ctr"/>
+            <a:r>
+              <a:rPr lang="en-US" dirty="0" smtClean="0"/>
+              <a:t>Thread B</a:t>
+            </a:r>
+            <a:endParaRPr lang="en-US" dirty="0"/>
+          </a:p>
+        </p:txBody>
+      </p:sp>
+      <p:sp>
+        <p:nvSpPr>
+          <p:cNvPr id="7" name="Oval 6"/>
+          <p:cNvSpPr/>
+          <p:nvPr/>
+        </p:nvSpPr>
+        <p:spPr>
+          <a:xfrm>
+            <a:off x="1573619" y="3838354"/>
+            <a:ext cx="2030818" cy="1924493"/>
+          </a:xfrm>
+          <a:prstGeom prst="ellipse">
+            <a:avLst/>
+          </a:prstGeom>
+          <a:solidFill>
+            <a:srgbClr val="00B0F0"/>
+          </a:solidFill>
+          <a:ln>
+            <a:noFill/>
+          </a:ln>
+        </p:spPr>
+        <p:style>
+          <a:lnRef idx="2">
+            <a:schemeClr val="accent1">
+              <a:shade val="50000"/>
+            </a:schemeClr>
+          </a:lnRef>
+          <a:fillRef idx="1">
+            <a:schemeClr val="accent1"/>
+          </a:fillRef>
+          <a:effectRef idx="0">
+            <a:schemeClr val="accent1"/>
+          </a:effectRef>
+          <a:fontRef idx="minor">
+            <a:schemeClr val="lt1"/>
+          </a:fontRef>
+        </p:style>
+        <p:txBody>
+          <a:bodyPr rtlCol="0" anchor="ctr"/>
+          <a:lstStyle/>
+          <a:p>
+            <a:pPr algn="ctr"/>
+            <a:r>
+              <a:rPr lang="en-US" dirty="0" smtClean="0"/>
+              <a:t>Shared</a:t>
+            </a:r>
+          </a:p>
+          <a:p>
+            <a:pPr algn="ctr"/>
+            <a:r>
+              <a:rPr lang="en-US" dirty="0" smtClean="0"/>
+              <a:t>Data A</a:t>
+            </a:r>
+            <a:endParaRPr lang="en-US" dirty="0"/>
+          </a:p>
+        </p:txBody>
+      </p:sp>
+      <p:sp>
+        <p:nvSpPr>
+          <p:cNvPr id="8" name="Oval 7"/>
+          <p:cNvSpPr/>
+          <p:nvPr/>
+        </p:nvSpPr>
+        <p:spPr>
+          <a:xfrm>
+            <a:off x="6478171" y="3838354"/>
+            <a:ext cx="2030818" cy="1924493"/>
+          </a:xfrm>
+          <a:prstGeom prst="ellipse">
+            <a:avLst/>
+          </a:prstGeom>
+          <a:solidFill>
+            <a:srgbClr val="7030A0"/>
+          </a:solidFill>
+          <a:ln>
+            <a:noFill/>
+          </a:ln>
+        </p:spPr>
+        <p:style>
+          <a:lnRef idx="2">
+            <a:schemeClr val="accent1">
+              <a:shade val="50000"/>
+            </a:schemeClr>
+          </a:lnRef>
+          <a:fillRef idx="1">
+            <a:schemeClr val="accent1"/>
+          </a:fillRef>
+          <a:effectRef idx="0">
+            <a:schemeClr val="accent1"/>
+          </a:effectRef>
+          <a:fontRef idx="minor">
+            <a:schemeClr val="lt1"/>
+          </a:fontRef>
+        </p:style>
+        <p:txBody>
+          <a:bodyPr rtlCol="0" anchor="ctr"/>
+          <a:lstStyle/>
+          <a:p>
+            <a:pPr algn="ctr"/>
+            <a:r>
+              <a:rPr lang="en-US" dirty="0" smtClean="0"/>
+              <a:t>Shared</a:t>
+            </a:r>
+          </a:p>
+          <a:p>
+            <a:pPr algn="ctr"/>
+            <a:r>
+              <a:rPr lang="en-US" dirty="0" smtClean="0"/>
+              <a:t>Data B</a:t>
+            </a:r>
+            <a:endParaRPr lang="en-US" dirty="0"/>
+          </a:p>
+        </p:txBody>
+      </p:sp>
+      <p:sp>
+        <p:nvSpPr>
+          <p:cNvPr id="9" name="TextBox 8"/>
+          <p:cNvSpPr txBox="1"/>
+          <p:nvPr/>
+        </p:nvSpPr>
+        <p:spPr>
+          <a:xfrm>
+            <a:off x="3739348" y="1220810"/>
+            <a:ext cx="2203745" cy="646331"/>
+          </a:xfrm>
+          <a:prstGeom prst="rect">
+            <a:avLst/>
+          </a:prstGeom>
+          <a:noFill/>
+        </p:spPr>
+        <p:txBody>
+          <a:bodyPr wrap="none" rtlCol="0">
+            <a:spAutoFit/>
+          </a:bodyPr>
+          <a:lstStyle/>
+          <a:p>
+            <a:r>
+              <a:rPr lang="en-US" dirty="0" smtClean="0"/>
+              <a:t>Thread A takes a lock</a:t>
+            </a:r>
+          </a:p>
+          <a:p>
+            <a:r>
+              <a:rPr lang="en-US" dirty="0" smtClean="0"/>
+              <a:t>on Shared Data A</a:t>
+            </a:r>
+            <a:endParaRPr lang="en-US" dirty="0"/>
+          </a:p>
+        </p:txBody>
+      </p:sp>
+      <p:sp>
+        <p:nvSpPr>
+          <p:cNvPr id="20" name="TextBox 19"/>
+          <p:cNvSpPr txBox="1"/>
+          <p:nvPr/>
+        </p:nvSpPr>
+        <p:spPr>
+          <a:xfrm>
+            <a:off x="3739348" y="1867141"/>
+            <a:ext cx="2250488" cy="646331"/>
+          </a:xfrm>
+          <a:prstGeom prst="rect">
+            <a:avLst/>
+          </a:prstGeom>
+          <a:noFill/>
+        </p:spPr>
+        <p:txBody>
+          <a:bodyPr wrap="none" rtlCol="0">
+            <a:spAutoFit/>
+          </a:bodyPr>
+          <a:lstStyle/>
+          <a:p>
+            <a:r>
+              <a:rPr lang="en-US" dirty="0" smtClean="0"/>
+              <a:t>Thread A </a:t>
+            </a:r>
+            <a:r>
+              <a:rPr lang="en-US" dirty="0" smtClean="0"/>
+              <a:t>tries to</a:t>
+            </a:r>
+            <a:r>
+              <a:rPr lang="en-US" dirty="0" smtClean="0"/>
+              <a:t> </a:t>
+            </a:r>
+            <a:r>
+              <a:rPr lang="en-US" dirty="0" smtClean="0"/>
+              <a:t>lock</a:t>
+            </a:r>
+          </a:p>
+          <a:p>
+            <a:r>
+              <a:rPr lang="en-US" dirty="0" smtClean="0"/>
+              <a:t>Shared Data B</a:t>
+            </a:r>
+            <a:endParaRPr lang="en-US" dirty="0"/>
+          </a:p>
+        </p:txBody>
+      </p:sp>
+      <p:sp>
+        <p:nvSpPr>
+          <p:cNvPr id="17" name="TextBox 16"/>
+          <p:cNvSpPr txBox="1"/>
+          <p:nvPr/>
+        </p:nvSpPr>
+        <p:spPr>
+          <a:xfrm>
+            <a:off x="8508985" y="1228541"/>
+            <a:ext cx="2407967" cy="646331"/>
+          </a:xfrm>
+          <a:prstGeom prst="rect">
+            <a:avLst/>
+          </a:prstGeom>
+          <a:noFill/>
+        </p:spPr>
+        <p:txBody>
+          <a:bodyPr wrap="none" rtlCol="0">
+            <a:spAutoFit/>
+          </a:bodyPr>
+          <a:lstStyle/>
+          <a:p>
+            <a:r>
+              <a:rPr lang="en-US" dirty="0" smtClean="0"/>
+              <a:t>Thread </a:t>
+            </a:r>
+            <a:r>
+              <a:rPr lang="en-US" dirty="0"/>
+              <a:t>B</a:t>
+            </a:r>
+            <a:r>
+              <a:rPr lang="en-US" dirty="0" smtClean="0"/>
+              <a:t> takes the lock</a:t>
+            </a:r>
+          </a:p>
+          <a:p>
+            <a:r>
+              <a:rPr lang="en-US" dirty="0" smtClean="0"/>
+              <a:t>on Shared Data B</a:t>
+            </a:r>
+          </a:p>
+        </p:txBody>
+      </p:sp>
+      <p:sp>
+        <p:nvSpPr>
+          <p:cNvPr id="2" name="TextBox 1"/>
+          <p:cNvSpPr txBox="1"/>
+          <p:nvPr/>
+        </p:nvSpPr>
+        <p:spPr>
+          <a:xfrm>
+            <a:off x="5045856" y="312869"/>
+            <a:ext cx="2103461" cy="523220"/>
+          </a:xfrm>
+          <a:prstGeom prst="rect">
+            <a:avLst/>
+          </a:prstGeom>
+          <a:noFill/>
+        </p:spPr>
+        <p:txBody>
+          <a:bodyPr wrap="none" rtlCol="0">
+            <a:spAutoFit/>
+          </a:bodyPr>
+          <a:lstStyle/>
+          <a:p>
+            <a:r>
+              <a:rPr lang="en-US" sz="2800" dirty="0" smtClean="0"/>
+              <a:t>DEADLOCK</a:t>
+            </a:r>
+            <a:endParaRPr lang="en-US" sz="2800" dirty="0"/>
+          </a:p>
+        </p:txBody>
+      </p:sp>
+      <p:sp>
+        <p:nvSpPr>
+          <p:cNvPr id="18" name="TextBox 17"/>
+          <p:cNvSpPr txBox="1"/>
+          <p:nvPr/>
+        </p:nvSpPr>
+        <p:spPr>
+          <a:xfrm>
+            <a:off x="8508985" y="1838141"/>
+            <a:ext cx="2249527" cy="646331"/>
+          </a:xfrm>
+          <a:prstGeom prst="rect">
+            <a:avLst/>
+          </a:prstGeom>
+          <a:noFill/>
+        </p:spPr>
+        <p:txBody>
+          <a:bodyPr wrap="none" rtlCol="0">
+            <a:spAutoFit/>
+          </a:bodyPr>
+          <a:lstStyle/>
+          <a:p>
+            <a:r>
+              <a:rPr lang="en-US" dirty="0" smtClean="0"/>
+              <a:t>Thread </a:t>
+            </a:r>
+            <a:r>
+              <a:rPr lang="en-US" dirty="0"/>
+              <a:t>B</a:t>
+            </a:r>
+            <a:r>
+              <a:rPr lang="en-US" dirty="0" smtClean="0"/>
+              <a:t> </a:t>
+            </a:r>
+            <a:r>
+              <a:rPr lang="en-US" dirty="0" smtClean="0"/>
+              <a:t>tries to</a:t>
+            </a:r>
+            <a:r>
+              <a:rPr lang="en-US" dirty="0" smtClean="0"/>
+              <a:t> </a:t>
+            </a:r>
+            <a:r>
+              <a:rPr lang="en-US" dirty="0" smtClean="0"/>
+              <a:t>lock</a:t>
+            </a:r>
+          </a:p>
+          <a:p>
+            <a:r>
+              <a:rPr lang="en-US" dirty="0" smtClean="0"/>
+              <a:t>Shared Data </a:t>
+            </a:r>
+            <a:r>
+              <a:rPr lang="en-US" dirty="0" smtClean="0"/>
+              <a:t>A</a:t>
+            </a:r>
+            <a:endParaRPr lang="en-US" dirty="0"/>
+          </a:p>
+        </p:txBody>
+      </p:sp>
+    </p:spTree>
+    <p:extLst>
+      <p:ext uri="{BB962C8B-B14F-4D97-AF65-F5344CB8AC3E}">
+        <p14:creationId xmlns:p14="http://schemas.microsoft.com/office/powerpoint/2010/main" val="1258141567"/>
+      </p:ext>
+    </p:extLst>
+  </p:cSld>
+  <p:clrMapOvr>
+    <a:masterClrMapping/>
+  </p:clrMapOvr>
+  <p:timing>
+    <p:tnLst>
+      <p:par>
+        <p:cTn id="1" dur="indefinite" restart="never" nodeType="tmRoot">
+          <p:childTnLst>
+            <p:seq concurrent="1" nextAc="seek">
+              <p:cTn id="2" dur="indefinite" nodeType="mainSeq">
+                <p:childTnLst>
+                  <p:par>
+                    <p:cTn id="3" fill="hold">
+                      <p:stCondLst>
+                        <p:cond delay="indefinite"/>
+                      </p:stCondLst>
+                      <p:childTnLst>
+                        <p:par>
+                          <p:cTn id="4" fill="hold">
+                            <p:stCondLst>
+                              <p:cond delay="0"/>
+                            </p:stCondLst>
+                            <p:childTnLst>
+                              <p:par>
+                                <p:cTn id="5" presetID="1" presetClass="entr" presetSubtype="0" fill="hold" grpId="1" nodeType="clickEffect">
+                                  <p:stCondLst>
+                                    <p:cond delay="0"/>
+                                  </p:stCondLst>
+                                  <p:childTnLst>
+                                    <p:set>
+                                      <p:cBhvr>
+                                        <p:cTn id="6" dur="1" fill="hold">
+                                          <p:stCondLst>
+                                            <p:cond delay="0"/>
+                                          </p:stCondLst>
+                                        </p:cTn>
+                                        <p:tgtEl>
+                                          <p:spTgt spid="9"/>
+                                        </p:tgtEl>
+                                        <p:attrNameLst>
+                                          <p:attrName>style.visibility</p:attrName>
+                                        </p:attrNameLst>
+                                      </p:cBhvr>
+                                      <p:to>
+                                        <p:strVal val="visible"/>
+                                      </p:to>
+                                    </p:set>
+                                  </p:childTnLst>
+                                </p:cTn>
+                              </p:par>
+                            </p:childTnLst>
+                          </p:cTn>
+                        </p:par>
+                      </p:childTnLst>
+                    </p:cTn>
+                  </p:par>
+                  <p:par>
+                    <p:cTn id="7" fill="hold">
+                      <p:stCondLst>
+                        <p:cond delay="indefinite"/>
+                      </p:stCondLst>
+                      <p:childTnLst>
+                        <p:par>
+                          <p:cTn id="8" fill="hold">
+                            <p:stCondLst>
+                              <p:cond delay="0"/>
+                            </p:stCondLst>
+                            <p:childTnLst>
+                              <p:par>
+                                <p:cTn id="9" presetID="1" presetClass="emph" presetSubtype="2" fill="hold" nodeType="clickEffect">
+                                  <p:stCondLst>
+                                    <p:cond delay="0"/>
+                                  </p:stCondLst>
+                                  <p:childTnLst>
+                                    <p:animClr clrSpc="rgb" dir="cw">
+                                      <p:cBhvr>
+                                        <p:cTn id="10" dur="1000" fill="hold"/>
+                                        <p:tgtEl>
+                                          <p:spTgt spid="7"/>
+                                        </p:tgtEl>
+                                        <p:attrNameLst>
+                                          <p:attrName>fillcolor</p:attrName>
+                                        </p:attrNameLst>
+                                      </p:cBhvr>
+                                      <p:to>
+                                        <a:schemeClr val="hlink"/>
+                                      </p:to>
+                                    </p:animClr>
+                                    <p:set>
+                                      <p:cBhvr>
+                                        <p:cTn id="11" dur="1000" fill="hold"/>
+                                        <p:tgtEl>
+                                          <p:spTgt spid="7"/>
+                                        </p:tgtEl>
+                                        <p:attrNameLst>
+                                          <p:attrName>fill.type</p:attrName>
+                                        </p:attrNameLst>
+                                      </p:cBhvr>
+                                      <p:to>
+                                        <p:strVal val="solid"/>
+                                      </p:to>
+                                    </p:set>
+                                    <p:set>
+                                      <p:cBhvr>
+                                        <p:cTn id="12" dur="1000" fill="hold"/>
+                                        <p:tgtEl>
+                                          <p:spTgt spid="7"/>
+                                        </p:tgtEl>
+                                        <p:attrNameLst>
+                                          <p:attrName>fill.on</p:attrName>
+                                        </p:attrNameLst>
+                                      </p:cBhvr>
+                                      <p:to>
+                                        <p:strVal val="true"/>
+                                      </p:to>
+                                    </p:set>
+                                  </p:childTnLst>
+                                </p:cTn>
+                              </p:par>
+                            </p:childTnLst>
+                          </p:cTn>
+                        </p:par>
+                      </p:childTnLst>
+                    </p:cTn>
+                  </p:par>
+                  <p:par>
+                    <p:cTn id="13" fill="hold">
+                      <p:stCondLst>
+                        <p:cond delay="indefinite"/>
+                      </p:stCondLst>
+                      <p:childTnLst>
+                        <p:par>
+                          <p:cTn id="14" fill="hold">
+                            <p:stCondLst>
+                              <p:cond delay="0"/>
+                            </p:stCondLst>
+                            <p:childTnLst>
+                              <p:par>
+                                <p:cTn id="15" presetID="1" presetClass="entr" presetSubtype="0" fill="hold" grpId="1" nodeType="clickEffect">
+                                  <p:stCondLst>
+                                    <p:cond delay="0"/>
+                                  </p:stCondLst>
+                                  <p:childTnLst>
+                                    <p:set>
+                                      <p:cBhvr>
+                                        <p:cTn id="16" dur="1" fill="hold">
+                                          <p:stCondLst>
+                                            <p:cond delay="0"/>
+                                          </p:stCondLst>
+                                        </p:cTn>
+                                        <p:tgtEl>
+                                          <p:spTgt spid="17"/>
+                                        </p:tgtEl>
+                                        <p:attrNameLst>
+                                          <p:attrName>style.visibility</p:attrName>
+                                        </p:attrNameLst>
+                                      </p:cBhvr>
+                                      <p:to>
+                                        <p:strVal val="visible"/>
+                                      </p:to>
+                                    </p:set>
+                                  </p:childTnLst>
+                                </p:cTn>
+                              </p:par>
+                            </p:childTnLst>
+                          </p:cTn>
+                        </p:par>
+                      </p:childTnLst>
+                    </p:cTn>
+                  </p:par>
+                  <p:par>
+                    <p:cTn id="17" fill="hold">
+                      <p:stCondLst>
+                        <p:cond delay="indefinite"/>
+                      </p:stCondLst>
+                      <p:childTnLst>
+                        <p:par>
+                          <p:cTn id="18" fill="hold">
+                            <p:stCondLst>
+                              <p:cond delay="0"/>
+                            </p:stCondLst>
+                            <p:childTnLst>
+                              <p:par>
+                                <p:cTn id="19" presetID="1" presetClass="emph" presetSubtype="2" fill="hold" nodeType="clickEffect">
+                                  <p:stCondLst>
+                                    <p:cond delay="0"/>
+                                  </p:stCondLst>
+                                  <p:childTnLst>
+                                    <p:animClr clrSpc="rgb" dir="cw">
+                                      <p:cBhvr>
+                                        <p:cTn id="20" dur="1000" fill="hold"/>
+                                        <p:tgtEl>
+                                          <p:spTgt spid="8"/>
+                                        </p:tgtEl>
+                                        <p:attrNameLst>
+                                          <p:attrName>fillcolor</p:attrName>
+                                        </p:attrNameLst>
+                                      </p:cBhvr>
+                                      <p:to>
+                                        <a:srgbClr val="FF9300"/>
+                                      </p:to>
+                                    </p:animClr>
+                                    <p:set>
+                                      <p:cBhvr>
+                                        <p:cTn id="21" dur="1000" fill="hold"/>
+                                        <p:tgtEl>
+                                          <p:spTgt spid="8"/>
+                                        </p:tgtEl>
+                                        <p:attrNameLst>
+                                          <p:attrName>fill.type</p:attrName>
+                                        </p:attrNameLst>
+                                      </p:cBhvr>
+                                      <p:to>
+                                        <p:strVal val="solid"/>
+                                      </p:to>
+                                    </p:set>
+                                    <p:set>
+                                      <p:cBhvr>
+                                        <p:cTn id="22" dur="1000" fill="hold"/>
+                                        <p:tgtEl>
+                                          <p:spTgt spid="8"/>
+                                        </p:tgtEl>
+                                        <p:attrNameLst>
+                                          <p:attrName>fill.on</p:attrName>
+                                        </p:attrNameLst>
+                                      </p:cBhvr>
+                                      <p:to>
+                                        <p:strVal val="true"/>
+                                      </p:to>
+                                    </p:set>
+                                  </p:childTnLst>
+                                </p:cTn>
+                              </p:par>
+                            </p:childTnLst>
+                          </p:cTn>
+                        </p:par>
+                      </p:childTnLst>
+                    </p:cTn>
+                  </p:par>
+                  <p:par>
+                    <p:cTn id="23" fill="hold">
+                      <p:stCondLst>
+                        <p:cond delay="indefinite"/>
+                      </p:stCondLst>
+                      <p:childTnLst>
+                        <p:par>
+                          <p:cTn id="24" fill="hold">
+                            <p:stCondLst>
+                              <p:cond delay="0"/>
+                            </p:stCondLst>
+                            <p:childTnLst>
+                              <p:par>
+                                <p:cTn id="25" presetID="1" presetClass="entr" presetSubtype="0" fill="hold" grpId="0" nodeType="clickEffect">
+                                  <p:stCondLst>
+                                    <p:cond delay="0"/>
+                                  </p:stCondLst>
+                                  <p:childTnLst>
+                                    <p:set>
+                                      <p:cBhvr>
+                                        <p:cTn id="26" dur="1" fill="hold">
                                           <p:stCondLst>
                                             <p:cond delay="0"/>
                                           </p:stCondLst>
@@ -11216,122 +12765,32 @@
                     </p:cTn>
                   </p:par>
                   <p:par>
-                    <p:cTn id="47" fill="hold">
+                    <p:cTn id="27" fill="hold">
                       <p:stCondLst>
                         <p:cond delay="indefinite"/>
                       </p:stCondLst>
                       <p:childTnLst>
                         <p:par>
-                          <p:cTn id="48" fill="hold">
+                          <p:cTn id="28" fill="hold">
                             <p:stCondLst>
                               <p:cond delay="0"/>
                             </p:stCondLst>
                             <p:childTnLst>
                               <p:par>
-                                <p:cTn id="49" presetID="1" presetClass="entr" presetSubtype="0" fill="hold" grpId="0" nodeType="clickEffect">
+                                <p:cTn id="29" presetID="1" presetClass="entr" presetSubtype="0" fill="hold" grpId="0" nodeType="clickEffect">
                                   <p:stCondLst>
                                     <p:cond delay="0"/>
                                   </p:stCondLst>
                                   <p:childTnLst>
                                     <p:set>
                                       <p:cBhvr>
-                                        <p:cTn id="50" dur="1" fill="hold">
+                                        <p:cTn id="30" dur="1" fill="hold">
                                           <p:stCondLst>
                                             <p:cond delay="0"/>
                                           </p:stCondLst>
                                         </p:cTn>
                                         <p:tgtEl>
-                                          <p:spTgt spid="19"/>
-                                        </p:tgtEl>
-                                        <p:attrNameLst>
-                                          <p:attrName>style.visibility</p:attrName>
-                                        </p:attrNameLst>
-                                      </p:cBhvr>
-                                      <p:to>
-                                        <p:strVal val="visible"/>
-                                      </p:to>
-                                    </p:set>
-                                  </p:childTnLst>
-                                </p:cTn>
-                              </p:par>
-                            </p:childTnLst>
-                          </p:cTn>
-                        </p:par>
-                      </p:childTnLst>
-                    </p:cTn>
-                  </p:par>
-                  <p:par>
-                    <p:cTn id="51" fill="hold">
-                      <p:stCondLst>
-                        <p:cond delay="indefinite"/>
-                      </p:stCondLst>
-                      <p:childTnLst>
-                        <p:par>
-                          <p:cTn id="52" fill="hold">
-                            <p:stCondLst>
-                              <p:cond delay="0"/>
-                            </p:stCondLst>
-                            <p:childTnLst>
-                              <p:par>
-                                <p:cTn id="53" presetID="1" presetClass="entr" presetSubtype="0" fill="hold" grpId="0" nodeType="clickEffect">
-                                  <p:stCondLst>
-                                    <p:cond delay="0"/>
-                                  </p:stCondLst>
-                                  <p:childTnLst>
-                                    <p:set>
-                                      <p:cBhvr>
-                                        <p:cTn id="54" dur="1" fill="hold">
-                                          <p:stCondLst>
-                                            <p:cond delay="0"/>
-                                          </p:stCondLst>
-                                        </p:cTn>
-                                        <p:tgtEl>
-                                          <p:spTgt spid="21"/>
-                                        </p:tgtEl>
-                                        <p:attrNameLst>
-                                          <p:attrName>style.visibility</p:attrName>
-                                        </p:attrNameLst>
-                                      </p:cBhvr>
-                                      <p:to>
-                                        <p:strVal val="visible"/>
-                                      </p:to>
-                                    </p:set>
-                                  </p:childTnLst>
-                                </p:cTn>
-                              </p:par>
-                            </p:childTnLst>
-                          </p:cTn>
-                        </p:par>
-                      </p:childTnLst>
-                    </p:cTn>
-                  </p:par>
-                  <p:par>
-                    <p:cTn id="55" fill="hold">
-                      <p:stCondLst>
-                        <p:cond delay="indefinite"/>
-                      </p:stCondLst>
-                      <p:childTnLst>
-                        <p:par>
-                          <p:cTn id="56" fill="hold">
-                            <p:stCondLst>
-                              <p:cond delay="0"/>
-                            </p:stCondLst>
-                            <p:childTnLst>
-                              <p:par>
-                                <p:cTn id="57" presetID="1" presetClass="entr" presetSubtype="0" fill="hold" grpId="0" nodeType="clickEffect">
-                                  <p:stCondLst>
-                                    <p:cond delay="0"/>
-                                  </p:stCondLst>
-                                  <p:childTnLst>
-                                    <p:set>
-                                      <p:cBhvr>
-                                        <p:cTn id="58" dur="1" fill="hold">
-                                          <p:stCondLst>
-                                            <p:cond delay="0"/>
-                                          </p:stCondLst>
-                                        </p:cTn>
-                                        <p:tgtEl>
-                                          <p:spTgt spid="22"/>
+                                          <p:spTgt spid="18"/>
                                         </p:tgtEl>
                                         <p:attrNameLst>
                                           <p:attrName>style.visibility</p:attrName>
@@ -11372,186 +12831,11 @@
       </p:par>
     </p:tnLst>
     <p:bldLst>
-      <p:bldP spid="5" grpId="0" animBg="1"/>
-      <p:bldP spid="6" grpId="0" animBg="1"/>
-      <p:bldP spid="7" grpId="0" animBg="1"/>
-      <p:bldP spid="8" grpId="0" animBg="1"/>
-      <p:bldP spid="9" grpId="0"/>
-      <p:bldP spid="10" grpId="0"/>
-      <p:bldP spid="18" grpId="0" animBg="1"/>
-      <p:bldP spid="19" grpId="0" animBg="1"/>
+      <p:bldP spid="9" grpId="1"/>
       <p:bldP spid="20" grpId="0"/>
-      <p:bldP spid="21" grpId="0"/>
-      <p:bldP spid="22" grpId="0"/>
+      <p:bldP spid="17" grpId="1"/>
+      <p:bldP spid="18" grpId="0"/>
     </p:bldLst>
-  </p:timing>
-</p:sld>
-</file>
-
-<file path=ppt/slides/slide28.xml><?xml version="1.0" encoding="utf-8"?>
-<p:sld xmlns:a="http://schemas.openxmlformats.org/drawingml/2006/main" xmlns:r="http://schemas.openxmlformats.org/officeDocument/2006/relationships" xmlns:p="http://schemas.openxmlformats.org/presentationml/2006/main">
-  <p:cSld>
-    <p:spTree>
-      <p:nvGrpSpPr>
-        <p:cNvPr id="1" name=""/>
-        <p:cNvGrpSpPr/>
-        <p:nvPr/>
-      </p:nvGrpSpPr>
-      <p:grpSpPr>
-        <a:xfrm>
-          <a:off x="0" y="0"/>
-          <a:ext cx="0" cy="0"/>
-          <a:chOff x="0" y="0"/>
-          <a:chExt cx="0" cy="0"/>
-        </a:xfrm>
-      </p:grpSpPr>
-      <p:sp>
-        <p:nvSpPr>
-          <p:cNvPr id="3" name="Title 2"/>
-          <p:cNvSpPr>
-            <a:spLocks noGrp="1"/>
-          </p:cNvSpPr>
-          <p:nvPr>
-            <p:ph type="title"/>
-          </p:nvPr>
-        </p:nvSpPr>
-        <p:spPr/>
-        <p:txBody>
-          <a:bodyPr/>
-          <a:lstStyle/>
-          <a:p>
-            <a:r>
-              <a:rPr lang="en-US" dirty="0" smtClean="0"/>
-              <a:t>Code Locking Strategies</a:t>
-            </a:r>
-            <a:endParaRPr lang="en-US" dirty="0"/>
-          </a:p>
-        </p:txBody>
-      </p:sp>
-      <p:sp>
-        <p:nvSpPr>
-          <p:cNvPr id="4" name="Content Placeholder 3"/>
-          <p:cNvSpPr>
-            <a:spLocks noGrp="1"/>
-          </p:cNvSpPr>
-          <p:nvPr>
-            <p:ph idx="1"/>
-          </p:nvPr>
-        </p:nvSpPr>
-        <p:spPr/>
-        <p:txBody>
-          <a:bodyPr/>
-          <a:lstStyle/>
-          <a:p>
-            <a:r>
-              <a:rPr lang="en-US" b="1" dirty="0" smtClean="0"/>
-              <a:t>Giant Lock</a:t>
-            </a:r>
-            <a:r>
-              <a:rPr lang="en-US" dirty="0" smtClean="0"/>
-              <a:t> </a:t>
-            </a:r>
-            <a:r>
-              <a:rPr lang="en-US" dirty="0"/>
-              <a:t>One big lock around the </a:t>
-            </a:r>
-            <a:r>
-              <a:rPr lang="en-US" dirty="0" smtClean="0"/>
-              <a:t>kernel</a:t>
-            </a:r>
-          </a:p>
-          <a:p>
-            <a:r>
-              <a:rPr lang="en-US" b="1" dirty="0" smtClean="0"/>
-              <a:t>List Locks </a:t>
-            </a:r>
-            <a:r>
-              <a:rPr lang="en-US" dirty="0"/>
-              <a:t>Lock every list in the </a:t>
-            </a:r>
-            <a:r>
-              <a:rPr lang="en-US" dirty="0" smtClean="0"/>
-              <a:t>kernel</a:t>
-            </a:r>
-          </a:p>
-          <a:p>
-            <a:r>
-              <a:rPr lang="en-US" b="1" dirty="0" smtClean="0"/>
-              <a:t>Structure Locks</a:t>
-            </a:r>
-            <a:r>
-              <a:rPr lang="en-US" dirty="0" smtClean="0"/>
-              <a:t> </a:t>
-            </a:r>
-            <a:r>
-              <a:rPr lang="en-US" dirty="0"/>
-              <a:t>Lock individual </a:t>
-            </a:r>
-            <a:r>
-              <a:rPr lang="en-US" dirty="0" smtClean="0"/>
-              <a:t>structures</a:t>
-            </a:r>
-          </a:p>
-          <a:p>
-            <a:endParaRPr lang="en-US" dirty="0" smtClean="0"/>
-          </a:p>
-          <a:p>
-            <a:pPr algn="ctr"/>
-            <a:r>
-              <a:rPr lang="en-US" b="1" dirty="0" smtClean="0"/>
-              <a:t>Poorly </a:t>
-            </a:r>
-            <a:r>
-              <a:rPr lang="en-US" b="1" dirty="0"/>
-              <a:t>chosen locking strategies impact </a:t>
-            </a:r>
-            <a:r>
-              <a:rPr lang="en-US" b="1" dirty="0" smtClean="0"/>
-              <a:t>performance</a:t>
-            </a:r>
-            <a:endParaRPr lang="en-US" b="1" dirty="0"/>
-          </a:p>
-        </p:txBody>
-      </p:sp>
-      <p:sp>
-        <p:nvSpPr>
-          <p:cNvPr id="2" name="Footer Placeholder 1"/>
-          <p:cNvSpPr>
-            <a:spLocks noGrp="1"/>
-          </p:cNvSpPr>
-          <p:nvPr>
-            <p:ph type="ftr" sz="quarter" idx="11"/>
-          </p:nvPr>
-        </p:nvSpPr>
-        <p:spPr/>
-        <p:txBody>
-          <a:bodyPr/>
-          <a:lstStyle/>
-          <a:p>
-            <a:r>
-              <a:rPr lang="en-US" smtClean="0"/>
-              <a:t>Introduction to Operating Systems</a:t>
-            </a:r>
-            <a:endParaRPr lang="en-US"/>
-          </a:p>
-        </p:txBody>
-      </p:sp>
-    </p:spTree>
-    <p:extLst>
-      <p:ext uri="{BB962C8B-B14F-4D97-AF65-F5344CB8AC3E}">
-        <p14:creationId xmlns:p14="http://schemas.microsoft.com/office/powerpoint/2010/main" val="632949301"/>
-      </p:ext>
-    </p:extLst>
-  </p:cSld>
-  <p:clrMapOvr>
-    <a:masterClrMapping/>
-  </p:clrMapOvr>
-  <p:timing>
-    <p:tnLst>
-      <p:par>
-        <p:cTn id="1" dur="indefinite" restart="never" nodeType="tmRoot"/>
-      </p:par>
-    </p:tnLst>
   </p:timing>
 </p:sld>
 </file>
@@ -11575,7 +12859,7 @@
       </p:grpSpPr>
       <p:sp>
         <p:nvSpPr>
-          <p:cNvPr id="2" name="Title 1"/>
+          <p:cNvPr id="3" name="Title 2"/>
           <p:cNvSpPr>
             <a:spLocks noGrp="1"/>
           </p:cNvSpPr>
@@ -11590,7 +12874,7 @@
           <a:p>
             <a:r>
               <a:rPr lang="en-US" dirty="0" smtClean="0"/>
-              <a:t>Lock Types</a:t>
+              <a:t>Code Locking Strategies</a:t>
             </a:r>
             <a:endParaRPr lang="en-US" dirty="0"/>
           </a:p>
@@ -11598,7 +12882,7 @@
       </p:sp>
       <p:sp>
         <p:nvSpPr>
-          <p:cNvPr id="3" name="Content Placeholder 2"/>
+          <p:cNvPr id="4" name="Content Placeholder 3"/>
           <p:cNvSpPr>
             <a:spLocks noGrp="1"/>
           </p:cNvSpPr>
@@ -11613,102 +12897,77 @@
           <a:p>
             <a:r>
               <a:rPr lang="en-US" b="1" dirty="0" smtClean="0"/>
-              <a:t>spin</a:t>
-            </a:r>
-            <a:r>
-              <a:rPr lang="en-US" dirty="0" smtClean="0"/>
-              <a:t> Check a value in a tight loop</a:t>
-            </a:r>
-          </a:p>
-          <a:p>
-            <a:r>
-              <a:rPr lang="en-US" b="1" dirty="0" err="1" smtClean="0"/>
-              <a:t>mutex</a:t>
-            </a:r>
-            <a:r>
-              <a:rPr lang="en-US" dirty="0" smtClean="0"/>
-              <a:t> Mutual exclusion lock</a:t>
-            </a:r>
-          </a:p>
-          <a:p>
-            <a:pPr lvl="1"/>
-            <a:r>
-              <a:rPr lang="en-US" dirty="0" smtClean="0"/>
-              <a:t>Spin to acquire</a:t>
-            </a:r>
-          </a:p>
-          <a:p>
-            <a:pPr lvl="1"/>
-            <a:r>
-              <a:rPr lang="en-US" dirty="0" smtClean="0"/>
-              <a:t>None shall pass</a:t>
+              <a:t>Giant Lock</a:t>
+            </a:r>
+            <a:r>
+              <a:rPr lang="en-US" dirty="0" smtClean="0"/>
+              <a:t> </a:t>
+            </a:r>
+            <a:r>
+              <a:rPr lang="en-US" dirty="0"/>
+              <a:t>One big lock around the </a:t>
+            </a:r>
+            <a:r>
+              <a:rPr lang="en-US" dirty="0" smtClean="0"/>
+              <a:t>kernel</a:t>
             </a:r>
           </a:p>
           <a:p>
             <a:r>
               <a:rPr lang="en-US" b="1" dirty="0" smtClean="0"/>
-              <a:t>r/w lock </a:t>
-            </a:r>
-            <a:r>
-              <a:rPr lang="en-US" dirty="0" smtClean="0"/>
-              <a:t>Reader/writer lock</a:t>
-            </a:r>
-          </a:p>
-          <a:p>
-            <a:pPr lvl="1"/>
-            <a:r>
-              <a:rPr lang="en-US" dirty="0" smtClean="0"/>
-              <a:t>Supports multiple, simultaneous readers or a single writer</a:t>
+              <a:t>List Locks </a:t>
+            </a:r>
+            <a:r>
+              <a:rPr lang="en-US" dirty="0"/>
+              <a:t>Lock every list in the </a:t>
+            </a:r>
+            <a:r>
+              <a:rPr lang="en-US" dirty="0" smtClean="0"/>
+              <a:t>kernel</a:t>
             </a:r>
           </a:p>
           <a:p>
             <a:r>
               <a:rPr lang="en-US" b="1" dirty="0" smtClean="0"/>
-              <a:t>r/m lock </a:t>
-            </a:r>
-            <a:r>
-              <a:rPr lang="en-US" dirty="0" smtClean="0"/>
-              <a:t>Read mostly lock</a:t>
-            </a:r>
-          </a:p>
-          <a:p>
-            <a:pPr lvl="1"/>
-            <a:r>
-              <a:rPr lang="en-US" dirty="0" smtClean="0"/>
-              <a:t>Reader writer lock tuned for very few writers</a:t>
-            </a:r>
-          </a:p>
-          <a:p>
-            <a:r>
-              <a:rPr lang="en-US" b="1" dirty="0" err="1" smtClean="0"/>
-              <a:t>sx</a:t>
-            </a:r>
+              <a:t>Structure Locks</a:t>
+            </a:r>
+            <a:r>
+              <a:rPr lang="en-US" dirty="0" smtClean="0"/>
+              <a:t> </a:t>
+            </a:r>
+            <a:r>
+              <a:rPr lang="en-US" dirty="0"/>
+              <a:t>Lock individual </a:t>
+            </a:r>
+            <a:r>
+              <a:rPr lang="en-US" dirty="0" smtClean="0"/>
+              <a:t>structures</a:t>
+            </a:r>
+          </a:p>
+          <a:p>
+            <a:endParaRPr lang="en-US" dirty="0" smtClean="0"/>
+          </a:p>
+          <a:p>
+            <a:pPr algn="ctr"/>
             <a:r>
               <a:rPr lang="en-US" b="1" dirty="0" smtClean="0"/>
-              <a:t> lock </a:t>
-            </a:r>
-            <a:r>
-              <a:rPr lang="en-US" dirty="0"/>
-              <a:t>Shared/exclusive </a:t>
-            </a:r>
-            <a:r>
-              <a:rPr lang="en-US" dirty="0" smtClean="0"/>
-              <a:t>lock</a:t>
-            </a:r>
-          </a:p>
-          <a:p>
-            <a:pPr lvl="1"/>
-            <a:r>
-              <a:rPr lang="en-US" dirty="0" smtClean="0"/>
-              <a:t>Can be held while sleeping</a:t>
-            </a:r>
-            <a:endParaRPr lang="en-US" dirty="0"/>
-          </a:p>
-        </p:txBody>
-      </p:sp>
-      <p:sp>
-        <p:nvSpPr>
-          <p:cNvPr id="4" name="Footer Placeholder 3"/>
+              <a:t>Poorly </a:t>
+            </a:r>
+            <a:r>
+              <a:rPr lang="en-US" b="1" dirty="0"/>
+              <a:t>chosen locking strategies impact </a:t>
+            </a:r>
+            <a:r>
+              <a:rPr lang="en-US" b="1" dirty="0" smtClean="0"/>
+              <a:t>performance</a:t>
+            </a:r>
+            <a:endParaRPr lang="en-US" b="1" dirty="0"/>
+          </a:p>
+        </p:txBody>
+      </p:sp>
+      <p:sp>
+        <p:nvSpPr>
+          <p:cNvPr id="2" name="Footer Placeholder 1"/>
           <p:cNvSpPr>
             <a:spLocks noGrp="1"/>
           </p:cNvSpPr>
@@ -11725,14 +12984,14 @@
               <a:rPr lang="en-US" smtClean="0"/>
               <a:t>Introduction to Operating Systems</a:t>
             </a:r>
-            <a:endParaRPr lang="en-US" dirty="0"/>
+            <a:endParaRPr lang="en-US"/>
           </a:p>
         </p:txBody>
       </p:sp>
     </p:spTree>
     <p:extLst>
       <p:ext uri="{BB962C8B-B14F-4D97-AF65-F5344CB8AC3E}">
-        <p14:creationId xmlns:p14="http://schemas.microsoft.com/office/powerpoint/2010/main" val="1586256491"/>
+        <p14:creationId xmlns:p14="http://schemas.microsoft.com/office/powerpoint/2010/main" val="632949301"/>
       </p:ext>
     </p:extLst>
   </p:cSld>
@@ -11923,15 +13182,7 @@
           <a:p>
             <a:r>
               <a:rPr lang="en-US" dirty="0" smtClean="0"/>
-              <a:t>The </a:t>
-            </a:r>
-            <a:r>
-              <a:rPr lang="en-US" dirty="0" err="1" smtClean="0"/>
-              <a:t>lockstat</a:t>
-            </a:r>
-            <a:r>
-              <a:rPr lang="en-US" dirty="0" smtClean="0"/>
-              <a:t> provider</a:t>
+              <a:t>Lock Types</a:t>
             </a:r>
             <a:endParaRPr lang="en-US" dirty="0"/>
           </a:p>
@@ -11951,59 +13202,6 @@
         <p:txBody>
           <a:bodyPr/>
           <a:lstStyle/>
-          <a:p>
-            <a:r>
-              <a:rPr lang="en-US" dirty="0" smtClean="0"/>
-              <a:t>All lock </a:t>
-            </a:r>
-            <a:r>
-              <a:rPr lang="en-US" dirty="0"/>
-              <a:t>types have similar </a:t>
-            </a:r>
-            <a:r>
-              <a:rPr lang="en-US" dirty="0" smtClean="0"/>
-              <a:t>probes, 29 </a:t>
-            </a:r>
-            <a:r>
-              <a:rPr lang="en-US" dirty="0"/>
-              <a:t>total probes in all  </a:t>
-            </a:r>
-            <a:endParaRPr lang="en-US" dirty="0" smtClean="0"/>
-          </a:p>
-          <a:p>
-            <a:r>
-              <a:rPr lang="en-US" b="1" dirty="0" smtClean="0"/>
-              <a:t>acquire</a:t>
-            </a:r>
-            <a:r>
-              <a:rPr lang="en-US" dirty="0" smtClean="0"/>
-              <a:t> </a:t>
-            </a:r>
-            <a:r>
-              <a:rPr lang="en-US" dirty="0"/>
-              <a:t>Code grabbed the lock </a:t>
-            </a:r>
-            <a:endParaRPr lang="en-US" dirty="0" smtClean="0"/>
-          </a:p>
-          <a:p>
-            <a:r>
-              <a:rPr lang="en-US" b="1" dirty="0" smtClean="0"/>
-              <a:t>block</a:t>
-            </a:r>
-            <a:r>
-              <a:rPr lang="en-US" dirty="0"/>
-              <a:t> </a:t>
-            </a:r>
-            <a:r>
-              <a:rPr lang="en-US" dirty="0" smtClean="0"/>
-              <a:t>Another </a:t>
-            </a:r>
-            <a:r>
-              <a:rPr lang="en-US" dirty="0"/>
-              <a:t>thread was blocked  </a:t>
-            </a:r>
-            <a:endParaRPr lang="en-US" dirty="0" smtClean="0"/>
-          </a:p>
           <a:p>
             <a:r>
               <a:rPr lang="en-US" b="1" dirty="0" smtClean="0"/>
@@ -12011,56 +13209,90 @@
             </a:r>
             <a:r>
               <a:rPr lang="en-US" dirty="0" smtClean="0"/>
-              <a:t> </a:t>
+              <a:t> Check a value in a tight loop</a:t>
+            </a:r>
+          </a:p>
+          <a:p>
+            <a:r>
+              <a:rPr lang="en-US" b="1" dirty="0" err="1" smtClean="0"/>
+              <a:t>mutex</a:t>
+            </a:r>
+            <a:r>
+              <a:rPr lang="en-US" dirty="0" smtClean="0"/>
+              <a:t> Mutual exclusion lock</a:t>
+            </a:r>
+          </a:p>
+          <a:p>
+            <a:pPr lvl="1"/>
+            <a:r>
+              <a:rPr lang="en-US" dirty="0" smtClean="0"/>
+              <a:t>Spin to acquire</a:t>
+            </a:r>
+          </a:p>
+          <a:p>
+            <a:pPr lvl="1"/>
+            <a:r>
+              <a:rPr lang="en-US" dirty="0" smtClean="0"/>
+              <a:t>None shall pass</a:t>
+            </a:r>
+          </a:p>
+          <a:p>
+            <a:r>
+              <a:rPr lang="en-US" b="1" dirty="0" smtClean="0"/>
+              <a:t>r/w lock </a:t>
+            </a:r>
+            <a:r>
+              <a:rPr lang="en-US" dirty="0" smtClean="0"/>
+              <a:t>Reader/writer lock</a:t>
+            </a:r>
+          </a:p>
+          <a:p>
+            <a:pPr lvl="1"/>
+            <a:r>
+              <a:rPr lang="en-US" dirty="0" smtClean="0"/>
+              <a:t>Supports multiple, simultaneous readers or a single writer</a:t>
+            </a:r>
+          </a:p>
+          <a:p>
+            <a:r>
+              <a:rPr lang="en-US" b="1" dirty="0" smtClean="0"/>
+              <a:t>r/m lock </a:t>
+            </a:r>
+            <a:r>
+              <a:rPr lang="en-US" dirty="0" smtClean="0"/>
+              <a:t>Read mostly lock</a:t>
+            </a:r>
+          </a:p>
+          <a:p>
+            <a:pPr lvl="1"/>
+            <a:r>
+              <a:rPr lang="en-US" dirty="0" smtClean="0"/>
+              <a:t>Reader writer lock tuned for very few writers</a:t>
+            </a:r>
+          </a:p>
+          <a:p>
+            <a:r>
+              <a:rPr lang="en-US" b="1" dirty="0" err="1" smtClean="0"/>
+              <a:t>sx</a:t>
+            </a:r>
+            <a:r>
+              <a:rPr lang="en-US" b="1" dirty="0" smtClean="0"/>
+              <a:t> lock </a:t>
             </a:r>
             <a:r>
               <a:rPr lang="en-US" dirty="0"/>
-              <a:t>Thread is spinning on the lock  </a:t>
-            </a:r>
-            <a:endParaRPr lang="en-US" dirty="0" smtClean="0"/>
-          </a:p>
-          <a:p>
-            <a:r>
-              <a:rPr lang="en-US" b="1" dirty="0" smtClean="0"/>
-              <a:t>release</a:t>
-            </a:r>
-            <a:r>
-              <a:rPr lang="en-US" dirty="0" smtClean="0"/>
-              <a:t> </a:t>
-            </a:r>
-            <a:r>
-              <a:rPr lang="en-US" dirty="0"/>
-              <a:t>Lock is </a:t>
-            </a:r>
-            <a:r>
-              <a:rPr lang="en-US" dirty="0" smtClean="0"/>
-              <a:t>released</a:t>
-            </a:r>
-          </a:p>
-          <a:p>
-            <a:r>
-              <a:rPr lang="en-US" dirty="0" smtClean="0"/>
-              <a:t>Arguments:</a:t>
-            </a:r>
-          </a:p>
-          <a:p>
-            <a:r>
-              <a:rPr lang="en-US" b="1" dirty="0" smtClean="0"/>
-              <a:t>arg0</a:t>
-            </a:r>
-            <a:r>
-              <a:rPr lang="en-US" dirty="0" smtClean="0"/>
-              <a:t> Address of the lock object</a:t>
-            </a:r>
-          </a:p>
-          <a:p>
-            <a:r>
-              <a:rPr lang="en-US" b="1" dirty="0" smtClean="0"/>
-              <a:t>arg1</a:t>
-            </a:r>
-            <a:r>
-              <a:rPr lang="en-US" dirty="0" smtClean="0"/>
-              <a:t> Lock or spin count</a:t>
+              <a:t>Shared/exclusive </a:t>
+            </a:r>
+            <a:r>
+              <a:rPr lang="en-US" dirty="0" smtClean="0"/>
+              <a:t>lock</a:t>
+            </a:r>
+          </a:p>
+          <a:p>
+            <a:pPr lvl="1"/>
+            <a:r>
+              <a:rPr lang="en-US" dirty="0" smtClean="0"/>
+              <a:t>Can be held while sleeping</a:t>
             </a:r>
             <a:endParaRPr lang="en-US" dirty="0"/>
           </a:p>
@@ -12092,7 +13324,7 @@
     </p:spTree>
     <p:extLst>
       <p:ext uri="{BB962C8B-B14F-4D97-AF65-F5344CB8AC3E}">
-        <p14:creationId xmlns:p14="http://schemas.microsoft.com/office/powerpoint/2010/main" val="1896799820"/>
+        <p14:creationId xmlns:p14="http://schemas.microsoft.com/office/powerpoint/2010/main" val="1586256491"/>
       </p:ext>
     </p:extLst>
   </p:cSld>
@@ -12143,11 +13375,7 @@
           <a:p>
             <a:r>
               <a:rPr lang="en-US" dirty="0" smtClean="0"/>
-              <a:t>Visualizing Locks with </a:t>
-            </a:r>
-            <a:r>
-              <a:rPr lang="en-US" dirty="0" err="1" smtClean="0"/>
-              <a:t>DTrace</a:t>
+              <a:t>Lock Debugging</a:t>
             </a:r>
             <a:endParaRPr lang="en-US" dirty="0"/>
           </a:p>
@@ -12168,6 +13396,47 @@
           <a:bodyPr/>
           <a:lstStyle/>
           <a:p>
+            <a:r>
+              <a:rPr lang="en-US" dirty="0" smtClean="0"/>
+              <a:t>The WITNESS system</a:t>
+            </a:r>
+          </a:p>
+          <a:p>
+            <a:pPr lvl="1"/>
+            <a:r>
+              <a:rPr lang="en-US" dirty="0" smtClean="0"/>
+              <a:t>A hand </a:t>
+            </a:r>
+            <a:r>
+              <a:rPr lang="en-US" smtClean="0"/>
+              <a:t>coded tracing system</a:t>
+            </a:r>
+            <a:endParaRPr lang="en-US" dirty="0" smtClean="0"/>
+          </a:p>
+          <a:p>
+            <a:r>
+              <a:rPr lang="en-US" dirty="0" smtClean="0"/>
+              <a:t>Kernel code that tracks lock acquisition and release</a:t>
+            </a:r>
+          </a:p>
+          <a:p>
+            <a:r>
+              <a:rPr lang="en-US" dirty="0" smtClean="0"/>
+              <a:t>Signals lock order reversals</a:t>
+            </a:r>
+          </a:p>
+          <a:p>
+            <a:r>
+              <a:rPr lang="en-US" dirty="0" smtClean="0"/>
+              <a:t>Not shipped in default releases</a:t>
+            </a:r>
+          </a:p>
+          <a:p>
+            <a:pPr lvl="1"/>
+            <a:r>
+              <a:rPr lang="en-US" dirty="0" smtClean="0"/>
+              <a:t>Why?</a:t>
+            </a:r>
             <a:endParaRPr lang="en-US" dirty="0"/>
           </a:p>
         </p:txBody>
@@ -12198,7 +13467,7 @@
     </p:spTree>
     <p:extLst>
       <p:ext uri="{BB962C8B-B14F-4D97-AF65-F5344CB8AC3E}">
-        <p14:creationId xmlns:p14="http://schemas.microsoft.com/office/powerpoint/2010/main" val="708802746"/>
+        <p14:creationId xmlns:p14="http://schemas.microsoft.com/office/powerpoint/2010/main" val="956093916"/>
       </p:ext>
     </p:extLst>
   </p:cSld>
@@ -12249,6 +13518,332 @@
           <a:p>
             <a:r>
               <a:rPr lang="en-US" dirty="0" smtClean="0"/>
+              <a:t>The </a:t>
+            </a:r>
+            <a:r>
+              <a:rPr lang="en-US" dirty="0" err="1" smtClean="0"/>
+              <a:t>lockstat</a:t>
+            </a:r>
+            <a:r>
+              <a:rPr lang="en-US" dirty="0" smtClean="0"/>
+              <a:t> provider</a:t>
+            </a:r>
+            <a:endParaRPr lang="en-US" dirty="0"/>
+          </a:p>
+        </p:txBody>
+      </p:sp>
+      <p:sp>
+        <p:nvSpPr>
+          <p:cNvPr id="3" name="Content Placeholder 2"/>
+          <p:cNvSpPr>
+            <a:spLocks noGrp="1"/>
+          </p:cNvSpPr>
+          <p:nvPr>
+            <p:ph idx="1"/>
+          </p:nvPr>
+        </p:nvSpPr>
+        <p:spPr/>
+        <p:txBody>
+          <a:bodyPr/>
+          <a:lstStyle/>
+          <a:p>
+            <a:r>
+              <a:rPr lang="en-US" dirty="0" smtClean="0"/>
+              <a:t>All lock </a:t>
+            </a:r>
+            <a:r>
+              <a:rPr lang="en-US" dirty="0"/>
+              <a:t>types have similar </a:t>
+            </a:r>
+            <a:r>
+              <a:rPr lang="en-US" dirty="0" smtClean="0"/>
+              <a:t>probes, 29 </a:t>
+            </a:r>
+            <a:r>
+              <a:rPr lang="en-US" dirty="0"/>
+              <a:t>total probes in all  </a:t>
+            </a:r>
+            <a:endParaRPr lang="en-US" dirty="0" smtClean="0"/>
+          </a:p>
+          <a:p>
+            <a:r>
+              <a:rPr lang="en-US" b="1" dirty="0" smtClean="0"/>
+              <a:t>acquire</a:t>
+            </a:r>
+            <a:r>
+              <a:rPr lang="en-US" dirty="0" smtClean="0"/>
+              <a:t> </a:t>
+            </a:r>
+            <a:r>
+              <a:rPr lang="en-US" dirty="0"/>
+              <a:t>Code grabbed the lock </a:t>
+            </a:r>
+            <a:endParaRPr lang="en-US" dirty="0" smtClean="0"/>
+          </a:p>
+          <a:p>
+            <a:r>
+              <a:rPr lang="en-US" b="1" dirty="0" smtClean="0"/>
+              <a:t>block</a:t>
+            </a:r>
+            <a:r>
+              <a:rPr lang="en-US" dirty="0"/>
+              <a:t> </a:t>
+            </a:r>
+            <a:r>
+              <a:rPr lang="en-US" dirty="0" smtClean="0"/>
+              <a:t>Another </a:t>
+            </a:r>
+            <a:r>
+              <a:rPr lang="en-US" dirty="0"/>
+              <a:t>thread was blocked  </a:t>
+            </a:r>
+            <a:endParaRPr lang="en-US" dirty="0" smtClean="0"/>
+          </a:p>
+          <a:p>
+            <a:r>
+              <a:rPr lang="en-US" b="1" dirty="0" smtClean="0"/>
+              <a:t>spin</a:t>
+            </a:r>
+            <a:r>
+              <a:rPr lang="en-US" dirty="0" smtClean="0"/>
+              <a:t> </a:t>
+            </a:r>
+            <a:r>
+              <a:rPr lang="en-US" dirty="0"/>
+              <a:t>Thread is spinning on the lock  </a:t>
+            </a:r>
+            <a:endParaRPr lang="en-US" dirty="0" smtClean="0"/>
+          </a:p>
+          <a:p>
+            <a:r>
+              <a:rPr lang="en-US" b="1" dirty="0" smtClean="0"/>
+              <a:t>release</a:t>
+            </a:r>
+            <a:r>
+              <a:rPr lang="en-US" dirty="0" smtClean="0"/>
+              <a:t> </a:t>
+            </a:r>
+            <a:r>
+              <a:rPr lang="en-US" dirty="0"/>
+              <a:t>Lock is </a:t>
+            </a:r>
+            <a:r>
+              <a:rPr lang="en-US" dirty="0" smtClean="0"/>
+              <a:t>released</a:t>
+            </a:r>
+          </a:p>
+          <a:p>
+            <a:r>
+              <a:rPr lang="en-US" dirty="0" smtClean="0"/>
+              <a:t>Arguments:</a:t>
+            </a:r>
+          </a:p>
+          <a:p>
+            <a:r>
+              <a:rPr lang="en-US" b="1" dirty="0" smtClean="0"/>
+              <a:t>arg0</a:t>
+            </a:r>
+            <a:r>
+              <a:rPr lang="en-US" dirty="0" smtClean="0"/>
+              <a:t> Address of the lock object</a:t>
+            </a:r>
+          </a:p>
+          <a:p>
+            <a:r>
+              <a:rPr lang="en-US" b="1" dirty="0" smtClean="0"/>
+              <a:t>arg1</a:t>
+            </a:r>
+            <a:r>
+              <a:rPr lang="en-US" dirty="0" smtClean="0"/>
+              <a:t> Lock or spin count</a:t>
+            </a:r>
+            <a:endParaRPr lang="en-US" dirty="0"/>
+          </a:p>
+        </p:txBody>
+      </p:sp>
+      <p:sp>
+        <p:nvSpPr>
+          <p:cNvPr id="4" name="Footer Placeholder 3"/>
+          <p:cNvSpPr>
+            <a:spLocks noGrp="1"/>
+          </p:cNvSpPr>
+          <p:nvPr>
+            <p:ph type="ftr" sz="quarter" idx="11"/>
+          </p:nvPr>
+        </p:nvSpPr>
+        <p:spPr/>
+        <p:txBody>
+          <a:bodyPr/>
+          <a:lstStyle/>
+          <a:p>
+            <a:r>
+              <a:rPr lang="en-US" smtClean="0"/>
+              <a:t>Introduction to Operating Systems</a:t>
+            </a:r>
+            <a:endParaRPr lang="en-US" dirty="0"/>
+          </a:p>
+        </p:txBody>
+      </p:sp>
+    </p:spTree>
+    <p:extLst>
+      <p:ext uri="{BB962C8B-B14F-4D97-AF65-F5344CB8AC3E}">
+        <p14:creationId xmlns:p14="http://schemas.microsoft.com/office/powerpoint/2010/main" val="1896799820"/>
+      </p:ext>
+    </p:extLst>
+  </p:cSld>
+  <p:clrMapOvr>
+    <a:masterClrMapping/>
+  </p:clrMapOvr>
+  <p:timing>
+    <p:tnLst>
+      <p:par>
+        <p:cTn id="1" dur="indefinite" restart="never" nodeType="tmRoot"/>
+      </p:par>
+    </p:tnLst>
+  </p:timing>
+</p:sld>
+</file>
+
+<file path=ppt/slides/slide33.xml><?xml version="1.0" encoding="utf-8"?>
+<p:sld xmlns:a="http://schemas.openxmlformats.org/drawingml/2006/main" xmlns:r="http://schemas.openxmlformats.org/officeDocument/2006/relationships" xmlns:p="http://schemas.openxmlformats.org/presentationml/2006/main">
+  <p:cSld>
+    <p:spTree>
+      <p:nvGrpSpPr>
+        <p:cNvPr id="1" name=""/>
+        <p:cNvGrpSpPr/>
+        <p:nvPr/>
+      </p:nvGrpSpPr>
+      <p:grpSpPr>
+        <a:xfrm>
+          <a:off x="0" y="0"/>
+          <a:ext cx="0" cy="0"/>
+          <a:chOff x="0" y="0"/>
+          <a:chExt cx="0" cy="0"/>
+        </a:xfrm>
+      </p:grpSpPr>
+      <p:sp>
+        <p:nvSpPr>
+          <p:cNvPr id="2" name="Title 1"/>
+          <p:cNvSpPr>
+            <a:spLocks noGrp="1"/>
+          </p:cNvSpPr>
+          <p:nvPr>
+            <p:ph type="title"/>
+          </p:nvPr>
+        </p:nvSpPr>
+        <p:spPr/>
+        <p:txBody>
+          <a:bodyPr/>
+          <a:lstStyle/>
+          <a:p>
+            <a:r>
+              <a:rPr lang="en-US" dirty="0" smtClean="0"/>
+              <a:t>Visualizing Locks with </a:t>
+            </a:r>
+            <a:r>
+              <a:rPr lang="en-US" dirty="0" err="1" smtClean="0"/>
+              <a:t>DTrace</a:t>
+            </a:r>
+            <a:endParaRPr lang="en-US" dirty="0"/>
+          </a:p>
+        </p:txBody>
+      </p:sp>
+      <p:sp>
+        <p:nvSpPr>
+          <p:cNvPr id="3" name="Content Placeholder 2"/>
+          <p:cNvSpPr>
+            <a:spLocks noGrp="1"/>
+          </p:cNvSpPr>
+          <p:nvPr>
+            <p:ph idx="1"/>
+          </p:nvPr>
+        </p:nvSpPr>
+        <p:spPr/>
+        <p:txBody>
+          <a:bodyPr/>
+          <a:lstStyle/>
+          <a:p>
+            <a:endParaRPr lang="en-US" dirty="0"/>
+          </a:p>
+        </p:txBody>
+      </p:sp>
+      <p:sp>
+        <p:nvSpPr>
+          <p:cNvPr id="4" name="Footer Placeholder 3"/>
+          <p:cNvSpPr>
+            <a:spLocks noGrp="1"/>
+          </p:cNvSpPr>
+          <p:nvPr>
+            <p:ph type="ftr" sz="quarter" idx="11"/>
+          </p:nvPr>
+        </p:nvSpPr>
+        <p:spPr/>
+        <p:txBody>
+          <a:bodyPr/>
+          <a:lstStyle/>
+          <a:p>
+            <a:r>
+              <a:rPr lang="en-US" smtClean="0"/>
+              <a:t>Introduction to Operating Systems</a:t>
+            </a:r>
+            <a:endParaRPr lang="en-US" dirty="0"/>
+          </a:p>
+        </p:txBody>
+      </p:sp>
+    </p:spTree>
+    <p:extLst>
+      <p:ext uri="{BB962C8B-B14F-4D97-AF65-F5344CB8AC3E}">
+        <p14:creationId xmlns:p14="http://schemas.microsoft.com/office/powerpoint/2010/main" val="708802746"/>
+      </p:ext>
+    </p:extLst>
+  </p:cSld>
+  <p:clrMapOvr>
+    <a:masterClrMapping/>
+  </p:clrMapOvr>
+  <p:timing>
+    <p:tnLst>
+      <p:par>
+        <p:cTn id="1" dur="indefinite" restart="never" nodeType="tmRoot"/>
+      </p:par>
+    </p:tnLst>
+  </p:timing>
+</p:sld>
+</file>
+
+<file path=ppt/slides/slide34.xml><?xml version="1.0" encoding="utf-8"?>
+<p:sld xmlns:a="http://schemas.openxmlformats.org/drawingml/2006/main" xmlns:r="http://schemas.openxmlformats.org/officeDocument/2006/relationships" xmlns:p="http://schemas.openxmlformats.org/presentationml/2006/main">
+  <p:cSld>
+    <p:spTree>
+      <p:nvGrpSpPr>
+        <p:cNvPr id="1" name=""/>
+        <p:cNvGrpSpPr/>
+        <p:nvPr/>
+      </p:nvGrpSpPr>
+      <p:grpSpPr>
+        <a:xfrm>
+          <a:off x="0" y="0"/>
+          <a:ext cx="0" cy="0"/>
+          <a:chOff x="0" y="0"/>
+          <a:chExt cx="0" cy="0"/>
+        </a:xfrm>
+      </p:grpSpPr>
+      <p:sp>
+        <p:nvSpPr>
+          <p:cNvPr id="2" name="Title 1"/>
+          <p:cNvSpPr>
+            <a:spLocks noGrp="1"/>
+          </p:cNvSpPr>
+          <p:nvPr>
+            <p:ph type="title"/>
+          </p:nvPr>
+        </p:nvSpPr>
+        <p:spPr/>
+        <p:txBody>
+          <a:bodyPr/>
+          <a:lstStyle/>
+          <a:p>
+            <a:r>
+              <a:rPr lang="en-US" dirty="0" smtClean="0"/>
               <a:t>Who is using locks?</a:t>
             </a:r>
             <a:endParaRPr lang="en-US" dirty="0"/>
@@ -12366,7 +13961,7 @@
 </p:sld>
 </file>
 
-<file path=ppt/slides/slide33.xml><?xml version="1.0" encoding="utf-8"?>
+<file path=ppt/slides/slide35.xml><?xml version="1.0" encoding="utf-8"?>
 <p:sld xmlns:a="http://schemas.openxmlformats.org/drawingml/2006/main" xmlns:r="http://schemas.openxmlformats.org/officeDocument/2006/relationships" xmlns:p="http://schemas.openxmlformats.org/presentationml/2006/main">
   <p:cSld>
     <p:spTree>
@@ -12671,12 +14266,9 @@
           <a:p>
             <a:r>
               <a:rPr lang="en-US" dirty="0" smtClean="0"/>
-              <a:t>Traps </a:t>
-            </a:r>
-            <a:r>
-              <a:rPr lang="en-US" dirty="0"/>
-              <a:t>and system calls</a:t>
-            </a:r>
+              <a:t>Scheduling</a:t>
+            </a:r>
+            <a:endParaRPr lang="en-US" dirty="0"/>
           </a:p>
           <a:p>
             <a:r>

</xml_diff>